<commit_message>
images visible on both light/dark backgrounds
</commit_message>
<xml_diff>
--- a/images/sequence_diagrams.pptx
+++ b/images/sequence_diagrams.pptx
@@ -14579,6 +14579,55 @@
       </p:grpSpPr>
       <p:sp>
         <p:nvSpPr>
+          <p:cNvPr id="8" name="正方形/長方形 7">
+            <a:extLst>
+              <a:ext uri="{FF2B5EF4-FFF2-40B4-BE49-F238E27FC236}">
+                <a16:creationId xmlns:a16="http://schemas.microsoft.com/office/drawing/2014/main" id="{9975A52D-008E-4241-9A99-451EB0FDCE5A}"/>
+              </a:ext>
+            </a:extLst>
+          </p:cNvPr>
+          <p:cNvSpPr/>
+          <p:nvPr/>
+        </p:nvSpPr>
+        <p:spPr>
+          <a:xfrm>
+            <a:off x="6503032" y="0"/>
+            <a:ext cx="5694634" cy="6858000"/>
+          </a:xfrm>
+          <a:prstGeom prst="rect">
+            <a:avLst/>
+          </a:prstGeom>
+          <a:solidFill>
+            <a:srgbClr val="22272E"/>
+          </a:solidFill>
+        </p:spPr>
+        <p:style>
+          <a:lnRef idx="2">
+            <a:schemeClr val="accent1">
+              <a:shade val="50000"/>
+            </a:schemeClr>
+          </a:lnRef>
+          <a:fillRef idx="1">
+            <a:schemeClr val="accent1"/>
+          </a:fillRef>
+          <a:effectRef idx="0">
+            <a:schemeClr val="accent1"/>
+          </a:effectRef>
+          <a:fontRef idx="minor">
+            <a:schemeClr val="lt1"/>
+          </a:fontRef>
+        </p:style>
+        <p:txBody>
+          <a:bodyPr rtlCol="0" anchor="ctr"/>
+          <a:lstStyle/>
+          <a:p>
+            <a:pPr algn="ctr"/>
+            <a:endParaRPr kumimoji="1" lang="ja-JP" altLang="en-US"/>
+          </a:p>
+        </p:txBody>
+      </p:sp>
+      <p:sp>
+        <p:nvSpPr>
           <p:cNvPr id="2" name="スライド番号プレースホルダー 1">
             <a:extLst>
               <a:ext uri="{FF2B5EF4-FFF2-40B4-BE49-F238E27FC236}">
@@ -14621,7 +14670,7 @@
         </p:nvGrpSpPr>
         <p:grpSpPr>
           <a:xfrm>
-            <a:off x="282488" y="325677"/>
+            <a:off x="711075" y="687343"/>
             <a:ext cx="4977894" cy="5731219"/>
             <a:chOff x="282488" y="325677"/>
             <a:chExt cx="4977894" cy="5731219"/>
@@ -14971,6 +15020,13 @@
                 <a:pPr algn="ctr"/>
                 <a:r>
                   <a:rPr kumimoji="1" lang="en-US" altLang="ja-JP" sz="1400" dirty="0">
+                    <a:effectLst>
+                      <a:glow rad="101600">
+                        <a:schemeClr val="bg1">
+                          <a:alpha val="80000"/>
+                        </a:schemeClr>
+                      </a:glow>
+                    </a:effectLst>
                     <a:latin typeface="Times New Roman" panose="02020603050405020304" pitchFamily="18" charset="0"/>
                     <a:cs typeface="Times New Roman" panose="02020603050405020304" pitchFamily="18" charset="0"/>
                   </a:rPr>
@@ -14978,6 +15034,13 @@
                 </a:r>
                 <a:r>
                   <a:rPr kumimoji="1" lang="en-US" altLang="ja-JP" sz="1400" dirty="0" err="1">
+                    <a:effectLst>
+                      <a:glow rad="101600">
+                        <a:schemeClr val="bg1">
+                          <a:alpha val="80000"/>
+                        </a:schemeClr>
+                      </a:glow>
+                    </a:effectLst>
                     <a:latin typeface="Times New Roman" panose="02020603050405020304" pitchFamily="18" charset="0"/>
                     <a:cs typeface="Times New Roman" panose="02020603050405020304" pitchFamily="18" charset="0"/>
                   </a:rPr>
@@ -14985,12 +15048,26 @@
                 </a:r>
                 <a:br>
                   <a:rPr kumimoji="1" lang="en-US" altLang="ja-JP" sz="1400" dirty="0">
+                    <a:effectLst>
+                      <a:glow rad="101600">
+                        <a:schemeClr val="bg1">
+                          <a:alpha val="80000"/>
+                        </a:schemeClr>
+                      </a:glow>
+                    </a:effectLst>
                     <a:latin typeface="Times New Roman" panose="02020603050405020304" pitchFamily="18" charset="0"/>
                     <a:cs typeface="Times New Roman" panose="02020603050405020304" pitchFamily="18" charset="0"/>
                   </a:rPr>
                 </a:br>
                 <a:r>
                   <a:rPr kumimoji="1" lang="en-US" altLang="ja-JP" sz="1400" dirty="0">
+                    <a:effectLst>
+                      <a:glow rad="101600">
+                        <a:schemeClr val="bg1">
+                          <a:alpha val="80000"/>
+                        </a:schemeClr>
+                      </a:glow>
+                    </a:effectLst>
                     <a:latin typeface="Times New Roman" panose="02020603050405020304" pitchFamily="18" charset="0"/>
                     <a:cs typeface="Times New Roman" panose="02020603050405020304" pitchFamily="18" charset="0"/>
                   </a:rPr>
@@ -14998,6 +15075,13 @@
                 </a:r>
                 <a:r>
                   <a:rPr lang="en-US" altLang="ja-JP" sz="1400" dirty="0">
+                    <a:effectLst>
+                      <a:glow rad="101600">
+                        <a:schemeClr val="bg1">
+                          <a:alpha val="80000"/>
+                        </a:schemeClr>
+                      </a:glow>
+                    </a:effectLst>
                     <a:latin typeface="Times New Roman" panose="02020603050405020304" pitchFamily="18" charset="0"/>
                     <a:cs typeface="Times New Roman" panose="02020603050405020304" pitchFamily="18" charset="0"/>
                   </a:rPr>
@@ -15005,6 +15089,13 @@
                 </a:r>
                 <a:r>
                   <a:rPr lang="ja-JP" altLang="en-US" sz="1400" dirty="0">
+                    <a:effectLst>
+                      <a:glow rad="101600">
+                        <a:schemeClr val="bg1">
+                          <a:alpha val="80000"/>
+                        </a:schemeClr>
+                      </a:glow>
+                    </a:effectLst>
                     <a:latin typeface="Times New Roman" panose="02020603050405020304" pitchFamily="18" charset="0"/>
                     <a:cs typeface="Times New Roman" panose="02020603050405020304" pitchFamily="18" charset="0"/>
                   </a:rPr>
@@ -15012,6 +15103,13 @@
                 </a:r>
                 <a:r>
                   <a:rPr lang="en-US" altLang="ja-JP" sz="1400" dirty="0">
+                    <a:effectLst>
+                      <a:glow rad="101600">
+                        <a:schemeClr val="bg1">
+                          <a:alpha val="80000"/>
+                        </a:schemeClr>
+                      </a:glow>
+                    </a:effectLst>
                     <a:latin typeface="Times New Roman" panose="02020603050405020304" pitchFamily="18" charset="0"/>
                     <a:cs typeface="Times New Roman" panose="02020603050405020304" pitchFamily="18" charset="0"/>
                   </a:rPr>
@@ -15019,6 +15117,13 @@
                 </a:r>
                 <a:r>
                   <a:rPr lang="ja-JP" altLang="en-US" sz="1400" dirty="0">
+                    <a:effectLst>
+                      <a:glow rad="101600">
+                        <a:schemeClr val="bg1">
+                          <a:alpha val="80000"/>
+                        </a:schemeClr>
+                      </a:glow>
+                    </a:effectLst>
                     <a:latin typeface="Times New Roman" panose="02020603050405020304" pitchFamily="18" charset="0"/>
                     <a:cs typeface="Times New Roman" panose="02020603050405020304" pitchFamily="18" charset="0"/>
                   </a:rPr>
@@ -15026,6 +15131,13 @@
                 </a:r>
                 <a:r>
                   <a:rPr lang="en-US" altLang="ja-JP" sz="1400" dirty="0">
+                    <a:effectLst>
+                      <a:glow rad="101600">
+                        <a:schemeClr val="bg1">
+                          <a:alpha val="80000"/>
+                        </a:schemeClr>
+                      </a:glow>
+                    </a:effectLst>
                     <a:latin typeface="Times New Roman" panose="02020603050405020304" pitchFamily="18" charset="0"/>
                     <a:cs typeface="Times New Roman" panose="02020603050405020304" pitchFamily="18" charset="0"/>
                   </a:rPr>
@@ -15033,12 +15145,26 @@
                 </a:r>
                 <a:r>
                   <a:rPr kumimoji="1" lang="en-US" altLang="ja-JP" sz="1400" dirty="0">
+                    <a:effectLst>
+                      <a:glow rad="101600">
+                        <a:schemeClr val="bg1">
+                          <a:alpha val="80000"/>
+                        </a:schemeClr>
+                      </a:glow>
+                    </a:effectLst>
                     <a:latin typeface="Times New Roman" panose="02020603050405020304" pitchFamily="18" charset="0"/>
                     <a:cs typeface="Times New Roman" panose="02020603050405020304" pitchFamily="18" charset="0"/>
                   </a:rPr>
                   <a:t>)</a:t>
                 </a:r>
                 <a:endParaRPr kumimoji="1" lang="ja-JP" altLang="en-US" sz="1400" dirty="0">
+                  <a:effectLst>
+                    <a:glow rad="101600">
+                      <a:schemeClr val="bg1">
+                        <a:alpha val="80000"/>
+                      </a:schemeClr>
+                    </a:glow>
+                  </a:effectLst>
                   <a:latin typeface="Times New Roman" panose="02020603050405020304" pitchFamily="18" charset="0"/>
                   <a:cs typeface="Times New Roman" panose="02020603050405020304" pitchFamily="18" charset="0"/>
                 </a:endParaRPr>
@@ -15229,6 +15355,13 @@
                 <a:pPr algn="ctr"/>
                 <a:r>
                   <a:rPr kumimoji="1" lang="en-US" altLang="ja-JP" sz="1400" dirty="0">
+                    <a:effectLst>
+                      <a:glow rad="101600">
+                        <a:schemeClr val="bg1">
+                          <a:alpha val="80000"/>
+                        </a:schemeClr>
+                      </a:glow>
+                    </a:effectLst>
                     <a:latin typeface="Times New Roman" panose="02020603050405020304" pitchFamily="18" charset="0"/>
                     <a:cs typeface="Times New Roman" panose="02020603050405020304" pitchFamily="18" charset="0"/>
                   </a:rPr>
@@ -15236,6 +15369,13 @@
                 </a:r>
                 <a:r>
                   <a:rPr kumimoji="1" lang="en-US" altLang="ja-JP" sz="1400" dirty="0" err="1">
+                    <a:effectLst>
+                      <a:glow rad="101600">
+                        <a:schemeClr val="bg1">
+                          <a:alpha val="80000"/>
+                        </a:schemeClr>
+                      </a:glow>
+                    </a:effectLst>
                     <a:latin typeface="Times New Roman" panose="02020603050405020304" pitchFamily="18" charset="0"/>
                     <a:cs typeface="Times New Roman" panose="02020603050405020304" pitchFamily="18" charset="0"/>
                   </a:rPr>
@@ -15243,6 +15383,13 @@
                 </a:r>
                 <a:r>
                   <a:rPr lang="en-US" altLang="ja-JP" sz="1400" dirty="0" err="1">
+                    <a:effectLst>
+                      <a:glow rad="101600">
+                        <a:schemeClr val="bg1">
+                          <a:alpha val="80000"/>
+                        </a:schemeClr>
+                      </a:glow>
+                    </a:effectLst>
                     <a:latin typeface="Times New Roman" panose="02020603050405020304" pitchFamily="18" charset="0"/>
                     <a:cs typeface="Times New Roman" panose="02020603050405020304" pitchFamily="18" charset="0"/>
                   </a:rPr>
@@ -15250,6 +15397,13 @@
                 </a:r>
                 <a:r>
                   <a:rPr kumimoji="1" lang="en-US" altLang="ja-JP" sz="1400" dirty="0" err="1">
+                    <a:effectLst>
+                      <a:glow rad="101600">
+                        <a:schemeClr val="bg1">
+                          <a:alpha val="80000"/>
+                        </a:schemeClr>
+                      </a:glow>
+                    </a:effectLst>
                     <a:latin typeface="Times New Roman" panose="02020603050405020304" pitchFamily="18" charset="0"/>
                     <a:cs typeface="Times New Roman" panose="02020603050405020304" pitchFamily="18" charset="0"/>
                   </a:rPr>
@@ -15257,12 +15411,26 @@
                 </a:r>
                 <a:r>
                   <a:rPr lang="en-US" altLang="ja-JP" sz="1400" baseline="30000" dirty="0">
+                    <a:effectLst>
+                      <a:glow rad="101600">
+                        <a:schemeClr val="bg1">
+                          <a:alpha val="80000"/>
+                        </a:schemeClr>
+                      </a:glow>
+                    </a:effectLst>
                     <a:latin typeface="Times New Roman" panose="02020603050405020304" pitchFamily="18" charset="0"/>
                     <a:cs typeface="Times New Roman" panose="02020603050405020304" pitchFamily="18" charset="0"/>
                   </a:rPr>
                   <a:t>*</a:t>
                 </a:r>
                 <a:endParaRPr kumimoji="1" lang="ja-JP" altLang="en-US" sz="1400" baseline="30000" dirty="0">
+                  <a:effectLst>
+                    <a:glow rad="101600">
+                      <a:schemeClr val="bg1">
+                        <a:alpha val="80000"/>
+                      </a:schemeClr>
+                    </a:glow>
+                  </a:effectLst>
                   <a:latin typeface="Times New Roman" panose="02020603050405020304" pitchFamily="18" charset="0"/>
                   <a:cs typeface="Times New Roman" panose="02020603050405020304" pitchFamily="18" charset="0"/>
                 </a:endParaRPr>
@@ -15453,6 +15621,13 @@
                 <a:pPr algn="ctr"/>
                 <a:r>
                   <a:rPr kumimoji="1" lang="en-US" altLang="ja-JP" sz="1400" dirty="0">
+                    <a:effectLst>
+                      <a:glow rad="101600">
+                        <a:schemeClr val="bg1">
+                          <a:alpha val="80000"/>
+                        </a:schemeClr>
+                      </a:glow>
+                    </a:effectLst>
                     <a:latin typeface="Times New Roman" panose="02020603050405020304" pitchFamily="18" charset="0"/>
                     <a:cs typeface="Times New Roman" panose="02020603050405020304" pitchFamily="18" charset="0"/>
                   </a:rPr>
@@ -15460,6 +15635,13 @@
                 </a:r>
                 <a:r>
                   <a:rPr lang="en-US" altLang="ja-JP" sz="1400" dirty="0" err="1">
+                    <a:effectLst>
+                      <a:glow rad="101600">
+                        <a:schemeClr val="bg1">
+                          <a:alpha val="80000"/>
+                        </a:schemeClr>
+                      </a:glow>
+                    </a:effectLst>
                     <a:latin typeface="Times New Roman" panose="02020603050405020304" pitchFamily="18" charset="0"/>
                     <a:cs typeface="Times New Roman" panose="02020603050405020304" pitchFamily="18" charset="0"/>
                   </a:rPr>
@@ -15467,6 +15649,13 @@
                 </a:r>
                 <a:r>
                   <a:rPr kumimoji="1" lang="en-US" altLang="ja-JP" sz="1400" dirty="0" err="1">
+                    <a:effectLst>
+                      <a:glow rad="101600">
+                        <a:schemeClr val="bg1">
+                          <a:alpha val="80000"/>
+                        </a:schemeClr>
+                      </a:glow>
+                    </a:effectLst>
                     <a:latin typeface="Times New Roman" panose="02020603050405020304" pitchFamily="18" charset="0"/>
                     <a:cs typeface="Times New Roman" panose="02020603050405020304" pitchFamily="18" charset="0"/>
                   </a:rPr>
@@ -15474,12 +15663,26 @@
                 </a:r>
                 <a:r>
                   <a:rPr lang="en-US" altLang="ja-JP" sz="1400" baseline="30000" dirty="0">
+                    <a:effectLst>
+                      <a:glow rad="101600">
+                        <a:schemeClr val="bg1">
+                          <a:alpha val="80000"/>
+                        </a:schemeClr>
+                      </a:glow>
+                    </a:effectLst>
                     <a:latin typeface="Times New Roman" panose="02020603050405020304" pitchFamily="18" charset="0"/>
                     <a:cs typeface="Times New Roman" panose="02020603050405020304" pitchFamily="18" charset="0"/>
                   </a:rPr>
                   <a:t>*</a:t>
                 </a:r>
                 <a:endParaRPr kumimoji="1" lang="ja-JP" altLang="en-US" sz="1400" dirty="0">
+                  <a:effectLst>
+                    <a:glow rad="101600">
+                      <a:schemeClr val="bg1">
+                        <a:alpha val="80000"/>
+                      </a:schemeClr>
+                    </a:glow>
+                  </a:effectLst>
                   <a:latin typeface="Times New Roman" panose="02020603050405020304" pitchFamily="18" charset="0"/>
                   <a:cs typeface="Times New Roman" panose="02020603050405020304" pitchFamily="18" charset="0"/>
                 </a:endParaRPr>
@@ -15754,6 +15957,13 @@
                 <a:pPr algn="r"/>
                 <a:r>
                   <a:rPr lang="en-US" altLang="ja-JP" sz="1400" dirty="0">
+                    <a:effectLst>
+                      <a:glow rad="101600">
+                        <a:schemeClr val="bg1">
+                          <a:alpha val="80000"/>
+                        </a:schemeClr>
+                      </a:glow>
+                    </a:effectLst>
                     <a:latin typeface="Times New Roman" panose="02020603050405020304" pitchFamily="18" charset="0"/>
                     <a:cs typeface="Times New Roman" panose="02020603050405020304" pitchFamily="18" charset="0"/>
                   </a:rPr>
@@ -15761,18 +15971,39 @@
                 </a:r>
                 <a:br>
                   <a:rPr lang="en-US" altLang="ja-JP" sz="1400" dirty="0">
+                    <a:effectLst>
+                      <a:glow rad="101600">
+                        <a:schemeClr val="bg1">
+                          <a:alpha val="80000"/>
+                        </a:schemeClr>
+                      </a:glow>
+                    </a:effectLst>
                     <a:latin typeface="Times New Roman" panose="02020603050405020304" pitchFamily="18" charset="0"/>
                     <a:cs typeface="Times New Roman" panose="02020603050405020304" pitchFamily="18" charset="0"/>
                   </a:rPr>
                 </a:br>
                 <a:r>
                   <a:rPr lang="en-US" altLang="ja-JP" sz="1400" dirty="0">
+                    <a:effectLst>
+                      <a:glow rad="101600">
+                        <a:schemeClr val="bg1">
+                          <a:alpha val="80000"/>
+                        </a:schemeClr>
+                      </a:glow>
+                    </a:effectLst>
                     <a:latin typeface="Times New Roman" panose="02020603050405020304" pitchFamily="18" charset="0"/>
                     <a:cs typeface="Times New Roman" panose="02020603050405020304" pitchFamily="18" charset="0"/>
                   </a:rPr>
                   <a:t>to a bag file</a:t>
                 </a:r>
                 <a:endParaRPr kumimoji="1" lang="ja-JP" altLang="en-US" sz="1400" dirty="0">
+                  <a:effectLst>
+                    <a:glow rad="101600">
+                      <a:schemeClr val="bg1">
+                        <a:alpha val="80000"/>
+                      </a:schemeClr>
+                    </a:glow>
+                  </a:effectLst>
                   <a:latin typeface="Times New Roman" panose="02020603050405020304" pitchFamily="18" charset="0"/>
                   <a:cs typeface="Times New Roman" panose="02020603050405020304" pitchFamily="18" charset="0"/>
                 </a:endParaRPr>
@@ -15811,6 +16042,13 @@
               <a:pPr algn="ctr"/>
               <a:r>
                 <a:rPr lang="en-US" altLang="ja-JP" sz="1400" baseline="30000" dirty="0">
+                  <a:effectLst>
+                    <a:glow rad="101600">
+                      <a:schemeClr val="bg1">
+                        <a:alpha val="80000"/>
+                      </a:schemeClr>
+                    </a:glow>
+                  </a:effectLst>
                   <a:latin typeface="Times New Roman" panose="02020603050405020304" pitchFamily="18" charset="0"/>
                   <a:cs typeface="Times New Roman" panose="02020603050405020304" pitchFamily="18" charset="0"/>
                 </a:rPr>
@@ -15818,12 +16056,26 @@
               </a:r>
               <a:r>
                 <a:rPr kumimoji="1" lang="en-US" altLang="ja-JP" sz="1400" dirty="0">
+                  <a:effectLst>
+                    <a:glow rad="101600">
+                      <a:schemeClr val="bg1">
+                        <a:alpha val="80000"/>
+                      </a:schemeClr>
+                    </a:glow>
+                  </a:effectLst>
                   <a:latin typeface="Times New Roman" panose="02020603050405020304" pitchFamily="18" charset="0"/>
                   <a:cs typeface="Times New Roman" panose="02020603050405020304" pitchFamily="18" charset="0"/>
                 </a:rPr>
                 <a:t>Called only if Gazebo is initially paused</a:t>
               </a:r>
               <a:endParaRPr kumimoji="1" lang="ja-JP" altLang="en-US" sz="1400" dirty="0">
+                <a:effectLst>
+                  <a:glow rad="101600">
+                    <a:schemeClr val="bg1">
+                      <a:alpha val="80000"/>
+                    </a:schemeClr>
+                  </a:glow>
+                </a:effectLst>
                 <a:latin typeface="Times New Roman" panose="02020603050405020304" pitchFamily="18" charset="0"/>
                 <a:cs typeface="Times New Roman" panose="02020603050405020304" pitchFamily="18" charset="0"/>
               </a:endParaRPr>
@@ -15881,6 +16133,13 @@
                 <a:pPr algn="ctr"/>
                 <a:r>
                   <a:rPr kumimoji="1" lang="en-US" altLang="ja-JP" sz="1400" dirty="0">
+                    <a:effectLst>
+                      <a:glow rad="101600">
+                        <a:schemeClr val="bg1">
+                          <a:alpha val="80000"/>
+                        </a:schemeClr>
+                      </a:glow>
+                    </a:effectLst>
                     <a:latin typeface="Times New Roman" panose="02020603050405020304" pitchFamily="18" charset="0"/>
                     <a:cs typeface="Times New Roman" panose="02020603050405020304" pitchFamily="18" charset="0"/>
                   </a:rPr>
@@ -15888,12 +16147,26 @@
                 </a:r>
                 <a:r>
                   <a:rPr kumimoji="1" lang="en-US" altLang="ja-JP" sz="1400" dirty="0" err="1">
+                    <a:effectLst>
+                      <a:glow rad="101600">
+                        <a:schemeClr val="bg1">
+                          <a:alpha val="80000"/>
+                        </a:schemeClr>
+                      </a:glow>
+                    </a:effectLst>
                     <a:latin typeface="Times New Roman" panose="02020603050405020304" pitchFamily="18" charset="0"/>
                     <a:cs typeface="Times New Roman" panose="02020603050405020304" pitchFamily="18" charset="0"/>
                   </a:rPr>
                   <a:t>link_states</a:t>
                 </a:r>
                 <a:endParaRPr kumimoji="1" lang="ja-JP" altLang="en-US" sz="1400" dirty="0">
+                  <a:effectLst>
+                    <a:glow rad="101600">
+                      <a:schemeClr val="bg1">
+                        <a:alpha val="80000"/>
+                      </a:schemeClr>
+                    </a:glow>
+                  </a:effectLst>
                   <a:latin typeface="Times New Roman" panose="02020603050405020304" pitchFamily="18" charset="0"/>
                   <a:cs typeface="Times New Roman" panose="02020603050405020304" pitchFamily="18" charset="0"/>
                 </a:endParaRPr>
@@ -16023,6 +16296,55 @@
       </p:grpSpPr>
       <p:sp>
         <p:nvSpPr>
+          <p:cNvPr id="37" name="正方形/長方形 36">
+            <a:extLst>
+              <a:ext uri="{FF2B5EF4-FFF2-40B4-BE49-F238E27FC236}">
+                <a16:creationId xmlns:a16="http://schemas.microsoft.com/office/drawing/2014/main" id="{68169EA6-AF28-4C9C-B08A-296BAA343A28}"/>
+              </a:ext>
+            </a:extLst>
+          </p:cNvPr>
+          <p:cNvSpPr/>
+          <p:nvPr/>
+        </p:nvSpPr>
+        <p:spPr>
+          <a:xfrm>
+            <a:off x="6497352" y="0"/>
+            <a:ext cx="5694634" cy="6858000"/>
+          </a:xfrm>
+          <a:prstGeom prst="rect">
+            <a:avLst/>
+          </a:prstGeom>
+          <a:solidFill>
+            <a:srgbClr val="22272E"/>
+          </a:solidFill>
+        </p:spPr>
+        <p:style>
+          <a:lnRef idx="2">
+            <a:schemeClr val="accent1">
+              <a:shade val="50000"/>
+            </a:schemeClr>
+          </a:lnRef>
+          <a:fillRef idx="1">
+            <a:schemeClr val="accent1"/>
+          </a:fillRef>
+          <a:effectRef idx="0">
+            <a:schemeClr val="accent1"/>
+          </a:effectRef>
+          <a:fontRef idx="minor">
+            <a:schemeClr val="lt1"/>
+          </a:fontRef>
+        </p:style>
+        <p:txBody>
+          <a:bodyPr rtlCol="0" anchor="ctr"/>
+          <a:lstStyle/>
+          <a:p>
+            <a:pPr algn="ctr"/>
+            <a:endParaRPr kumimoji="1" lang="ja-JP" altLang="en-US"/>
+          </a:p>
+        </p:txBody>
+      </p:sp>
+      <p:sp>
+        <p:nvSpPr>
           <p:cNvPr id="2" name="スライド番号プレースホルダー 1">
             <a:extLst>
               <a:ext uri="{FF2B5EF4-FFF2-40B4-BE49-F238E27FC236}">
@@ -16065,7 +16387,7 @@
         </p:nvGrpSpPr>
         <p:grpSpPr>
           <a:xfrm>
-            <a:off x="282488" y="325677"/>
+            <a:off x="611335" y="248656"/>
             <a:ext cx="4977894" cy="6290256"/>
             <a:chOff x="282488" y="325677"/>
             <a:chExt cx="4977894" cy="6290256"/>
@@ -16423,6 +16745,13 @@
                 <a:pPr algn="ctr"/>
                 <a:r>
                   <a:rPr kumimoji="1" lang="en-US" altLang="ja-JP" sz="1400" dirty="0">
+                    <a:effectLst>
+                      <a:glow rad="101600">
+                        <a:schemeClr val="bg1">
+                          <a:alpha val="80000"/>
+                        </a:schemeClr>
+                      </a:glow>
+                    </a:effectLst>
                     <a:latin typeface="Times New Roman" panose="02020603050405020304" pitchFamily="18" charset="0"/>
                     <a:cs typeface="Times New Roman" panose="02020603050405020304" pitchFamily="18" charset="0"/>
                   </a:rPr>
@@ -16430,6 +16759,13 @@
                 </a:r>
                 <a:r>
                   <a:rPr kumimoji="1" lang="en-US" altLang="ja-JP" sz="1400" dirty="0" err="1">
+                    <a:effectLst>
+                      <a:glow rad="101600">
+                        <a:schemeClr val="bg1">
+                          <a:alpha val="80000"/>
+                        </a:schemeClr>
+                      </a:glow>
+                    </a:effectLst>
                     <a:latin typeface="Times New Roman" panose="02020603050405020304" pitchFamily="18" charset="0"/>
                     <a:cs typeface="Times New Roman" panose="02020603050405020304" pitchFamily="18" charset="0"/>
                   </a:rPr>
@@ -16437,12 +16773,26 @@
                 </a:r>
                 <a:br>
                   <a:rPr kumimoji="1" lang="en-US" altLang="ja-JP" sz="1400" dirty="0">
+                    <a:effectLst>
+                      <a:glow rad="101600">
+                        <a:schemeClr val="bg1">
+                          <a:alpha val="80000"/>
+                        </a:schemeClr>
+                      </a:glow>
+                    </a:effectLst>
                     <a:latin typeface="Times New Roman" panose="02020603050405020304" pitchFamily="18" charset="0"/>
                     <a:cs typeface="Times New Roman" panose="02020603050405020304" pitchFamily="18" charset="0"/>
                   </a:rPr>
                 </a:br>
                 <a:r>
                   <a:rPr kumimoji="1" lang="en-US" altLang="ja-JP" sz="1400" dirty="0">
+                    <a:effectLst>
+                      <a:glow rad="101600">
+                        <a:schemeClr val="bg1">
+                          <a:alpha val="80000"/>
+                        </a:schemeClr>
+                      </a:glow>
+                    </a:effectLst>
                     <a:latin typeface="Times New Roman" panose="02020603050405020304" pitchFamily="18" charset="0"/>
                     <a:cs typeface="Times New Roman" panose="02020603050405020304" pitchFamily="18" charset="0"/>
                   </a:rPr>
@@ -16450,6 +16800,13 @@
                 </a:r>
                 <a:r>
                   <a:rPr lang="en-US" altLang="ja-JP" sz="1400" dirty="0">
+                    <a:effectLst>
+                      <a:glow rad="101600">
+                        <a:schemeClr val="bg1">
+                          <a:alpha val="80000"/>
+                        </a:schemeClr>
+                      </a:glow>
+                    </a:effectLst>
                     <a:latin typeface="Times New Roman" panose="02020603050405020304" pitchFamily="18" charset="0"/>
                     <a:cs typeface="Times New Roman" panose="02020603050405020304" pitchFamily="18" charset="0"/>
                   </a:rPr>
@@ -16457,6 +16814,13 @@
                 </a:r>
                 <a:r>
                   <a:rPr lang="ja-JP" altLang="en-US" sz="1400" dirty="0">
+                    <a:effectLst>
+                      <a:glow rad="101600">
+                        <a:schemeClr val="bg1">
+                          <a:alpha val="80000"/>
+                        </a:schemeClr>
+                      </a:glow>
+                    </a:effectLst>
                     <a:latin typeface="Times New Roman" panose="02020603050405020304" pitchFamily="18" charset="0"/>
                     <a:cs typeface="Times New Roman" panose="02020603050405020304" pitchFamily="18" charset="0"/>
                   </a:rPr>
@@ -16464,6 +16828,13 @@
                 </a:r>
                 <a:r>
                   <a:rPr lang="en-US" altLang="ja-JP" sz="1400" dirty="0">
+                    <a:effectLst>
+                      <a:glow rad="101600">
+                        <a:schemeClr val="bg1">
+                          <a:alpha val="80000"/>
+                        </a:schemeClr>
+                      </a:glow>
+                    </a:effectLst>
                     <a:latin typeface="Times New Roman" panose="02020603050405020304" pitchFamily="18" charset="0"/>
                     <a:cs typeface="Times New Roman" panose="02020603050405020304" pitchFamily="18" charset="0"/>
                   </a:rPr>
@@ -16471,6 +16842,13 @@
                 </a:r>
                 <a:r>
                   <a:rPr lang="ja-JP" altLang="en-US" sz="1400" dirty="0">
+                    <a:effectLst>
+                      <a:glow rad="101600">
+                        <a:schemeClr val="bg1">
+                          <a:alpha val="80000"/>
+                        </a:schemeClr>
+                      </a:glow>
+                    </a:effectLst>
                     <a:latin typeface="Times New Roman" panose="02020603050405020304" pitchFamily="18" charset="0"/>
                     <a:cs typeface="Times New Roman" panose="02020603050405020304" pitchFamily="18" charset="0"/>
                   </a:rPr>
@@ -16478,6 +16856,13 @@
                 </a:r>
                 <a:r>
                   <a:rPr lang="en-US" altLang="ja-JP" sz="1400" dirty="0">
+                    <a:effectLst>
+                      <a:glow rad="101600">
+                        <a:schemeClr val="bg1">
+                          <a:alpha val="80000"/>
+                        </a:schemeClr>
+                      </a:glow>
+                    </a:effectLst>
                     <a:latin typeface="Times New Roman" panose="02020603050405020304" pitchFamily="18" charset="0"/>
                     <a:cs typeface="Times New Roman" panose="02020603050405020304" pitchFamily="18" charset="0"/>
                   </a:rPr>
@@ -16485,12 +16870,26 @@
                 </a:r>
                 <a:r>
                   <a:rPr kumimoji="1" lang="en-US" altLang="ja-JP" sz="1400" dirty="0">
+                    <a:effectLst>
+                      <a:glow rad="101600">
+                        <a:schemeClr val="bg1">
+                          <a:alpha val="80000"/>
+                        </a:schemeClr>
+                      </a:glow>
+                    </a:effectLst>
                     <a:latin typeface="Times New Roman" panose="02020603050405020304" pitchFamily="18" charset="0"/>
                     <a:cs typeface="Times New Roman" panose="02020603050405020304" pitchFamily="18" charset="0"/>
                   </a:rPr>
                   <a:t>)</a:t>
                 </a:r>
                 <a:endParaRPr kumimoji="1" lang="ja-JP" altLang="en-US" sz="1400" dirty="0">
+                  <a:effectLst>
+                    <a:glow rad="101600">
+                      <a:schemeClr val="bg1">
+                        <a:alpha val="80000"/>
+                      </a:schemeClr>
+                    </a:glow>
+                  </a:effectLst>
                   <a:latin typeface="Times New Roman" panose="02020603050405020304" pitchFamily="18" charset="0"/>
                   <a:cs typeface="Times New Roman" panose="02020603050405020304" pitchFamily="18" charset="0"/>
                 </a:endParaRPr>
@@ -16681,6 +17080,13 @@
                 <a:pPr algn="ctr"/>
                 <a:r>
                   <a:rPr kumimoji="1" lang="en-US" altLang="ja-JP" sz="1400" dirty="0">
+                    <a:effectLst>
+                      <a:glow rad="101600">
+                        <a:schemeClr val="bg1">
+                          <a:alpha val="80000"/>
+                        </a:schemeClr>
+                      </a:glow>
+                    </a:effectLst>
                     <a:latin typeface="Times New Roman" panose="02020603050405020304" pitchFamily="18" charset="0"/>
                     <a:cs typeface="Times New Roman" panose="02020603050405020304" pitchFamily="18" charset="0"/>
                   </a:rPr>
@@ -16688,6 +17094,13 @@
                 </a:r>
                 <a:r>
                   <a:rPr lang="en-US" altLang="ja-JP" sz="1400" dirty="0" err="1">
+                    <a:effectLst>
+                      <a:glow rad="101600">
+                        <a:schemeClr val="bg1">
+                          <a:alpha val="80000"/>
+                        </a:schemeClr>
+                      </a:glow>
+                    </a:effectLst>
                     <a:latin typeface="Times New Roman" panose="02020603050405020304" pitchFamily="18" charset="0"/>
                     <a:cs typeface="Times New Roman" panose="02020603050405020304" pitchFamily="18" charset="0"/>
                   </a:rPr>
@@ -16695,6 +17108,13 @@
                 </a:r>
                 <a:r>
                   <a:rPr kumimoji="1" lang="en-US" altLang="ja-JP" sz="1400" dirty="0" err="1">
+                    <a:effectLst>
+                      <a:glow rad="101600">
+                        <a:schemeClr val="bg1">
+                          <a:alpha val="80000"/>
+                        </a:schemeClr>
+                      </a:glow>
+                    </a:effectLst>
                     <a:latin typeface="Times New Roman" panose="02020603050405020304" pitchFamily="18" charset="0"/>
                     <a:cs typeface="Times New Roman" panose="02020603050405020304" pitchFamily="18" charset="0"/>
                   </a:rPr>
@@ -16702,12 +17122,26 @@
                 </a:r>
                 <a:r>
                   <a:rPr lang="en-US" altLang="ja-JP" sz="1400" baseline="30000" dirty="0">
+                    <a:effectLst>
+                      <a:glow rad="101600">
+                        <a:schemeClr val="bg1">
+                          <a:alpha val="80000"/>
+                        </a:schemeClr>
+                      </a:glow>
+                    </a:effectLst>
                     <a:latin typeface="Times New Roman" panose="02020603050405020304" pitchFamily="18" charset="0"/>
                     <a:cs typeface="Times New Roman" panose="02020603050405020304" pitchFamily="18" charset="0"/>
                   </a:rPr>
                   <a:t>*</a:t>
                 </a:r>
                 <a:endParaRPr kumimoji="1" lang="ja-JP" altLang="en-US" sz="1400" baseline="30000" dirty="0">
+                  <a:effectLst>
+                    <a:glow rad="101600">
+                      <a:schemeClr val="bg1">
+                        <a:alpha val="80000"/>
+                      </a:schemeClr>
+                    </a:glow>
+                  </a:effectLst>
                   <a:latin typeface="Times New Roman" panose="02020603050405020304" pitchFamily="18" charset="0"/>
                   <a:cs typeface="Times New Roman" panose="02020603050405020304" pitchFamily="18" charset="0"/>
                 </a:endParaRPr>
@@ -16898,6 +17332,13 @@
                 <a:pPr algn="ctr"/>
                 <a:r>
                   <a:rPr kumimoji="1" lang="en-US" altLang="ja-JP" sz="1400" dirty="0">
+                    <a:effectLst>
+                      <a:glow rad="101600">
+                        <a:schemeClr val="bg1">
+                          <a:alpha val="80000"/>
+                        </a:schemeClr>
+                      </a:glow>
+                    </a:effectLst>
                     <a:latin typeface="Times New Roman" panose="02020603050405020304" pitchFamily="18" charset="0"/>
                     <a:cs typeface="Times New Roman" panose="02020603050405020304" pitchFamily="18" charset="0"/>
                   </a:rPr>
@@ -16905,6 +17346,13 @@
                 </a:r>
                 <a:r>
                   <a:rPr kumimoji="1" lang="en-US" altLang="ja-JP" sz="1400" dirty="0" err="1">
+                    <a:effectLst>
+                      <a:glow rad="101600">
+                        <a:schemeClr val="bg1">
+                          <a:alpha val="80000"/>
+                        </a:schemeClr>
+                      </a:glow>
+                    </a:effectLst>
                     <a:latin typeface="Times New Roman" panose="02020603050405020304" pitchFamily="18" charset="0"/>
                     <a:cs typeface="Times New Roman" panose="02020603050405020304" pitchFamily="18" charset="0"/>
                   </a:rPr>
@@ -16912,6 +17360,13 @@
                 </a:r>
                 <a:r>
                   <a:rPr lang="en-US" altLang="ja-JP" sz="1400" dirty="0" err="1">
+                    <a:effectLst>
+                      <a:glow rad="101600">
+                        <a:schemeClr val="bg1">
+                          <a:alpha val="80000"/>
+                        </a:schemeClr>
+                      </a:glow>
+                    </a:effectLst>
                     <a:latin typeface="Times New Roman" panose="02020603050405020304" pitchFamily="18" charset="0"/>
                     <a:cs typeface="Times New Roman" panose="02020603050405020304" pitchFamily="18" charset="0"/>
                   </a:rPr>
@@ -16919,6 +17374,13 @@
                 </a:r>
                 <a:r>
                   <a:rPr kumimoji="1" lang="en-US" altLang="ja-JP" sz="1400" dirty="0" err="1">
+                    <a:effectLst>
+                      <a:glow rad="101600">
+                        <a:schemeClr val="bg1">
+                          <a:alpha val="80000"/>
+                        </a:schemeClr>
+                      </a:glow>
+                    </a:effectLst>
                     <a:latin typeface="Times New Roman" panose="02020603050405020304" pitchFamily="18" charset="0"/>
                     <a:cs typeface="Times New Roman" panose="02020603050405020304" pitchFamily="18" charset="0"/>
                   </a:rPr>
@@ -16926,12 +17388,26 @@
                 </a:r>
                 <a:r>
                   <a:rPr lang="en-US" altLang="ja-JP" sz="1400" baseline="30000" dirty="0">
+                    <a:effectLst>
+                      <a:glow rad="101600">
+                        <a:schemeClr val="bg1">
+                          <a:alpha val="80000"/>
+                        </a:schemeClr>
+                      </a:glow>
+                    </a:effectLst>
                     <a:latin typeface="Times New Roman" panose="02020603050405020304" pitchFamily="18" charset="0"/>
                     <a:cs typeface="Times New Roman" panose="02020603050405020304" pitchFamily="18" charset="0"/>
                   </a:rPr>
                   <a:t>*</a:t>
                 </a:r>
                 <a:endParaRPr kumimoji="1" lang="ja-JP" altLang="en-US" sz="1400" dirty="0">
+                  <a:effectLst>
+                    <a:glow rad="101600">
+                      <a:schemeClr val="bg1">
+                        <a:alpha val="80000"/>
+                      </a:schemeClr>
+                    </a:glow>
+                  </a:effectLst>
                   <a:latin typeface="Times New Roman" panose="02020603050405020304" pitchFamily="18" charset="0"/>
                   <a:cs typeface="Times New Roman" panose="02020603050405020304" pitchFamily="18" charset="0"/>
                 </a:endParaRPr>
@@ -17206,6 +17682,13 @@
                 <a:pPr algn="r"/>
                 <a:r>
                   <a:rPr lang="en-US" altLang="ja-JP" sz="1400" dirty="0">
+                    <a:effectLst>
+                      <a:glow rad="101600">
+                        <a:schemeClr val="bg1">
+                          <a:alpha val="80000"/>
+                        </a:schemeClr>
+                      </a:glow>
+                    </a:effectLst>
                     <a:latin typeface="Times New Roman" panose="02020603050405020304" pitchFamily="18" charset="0"/>
                     <a:cs typeface="Times New Roman" panose="02020603050405020304" pitchFamily="18" charset="0"/>
                   </a:rPr>
@@ -17213,18 +17696,39 @@
                 </a:r>
                 <a:br>
                   <a:rPr lang="en-US" altLang="ja-JP" sz="1400" dirty="0">
+                    <a:effectLst>
+                      <a:glow rad="101600">
+                        <a:schemeClr val="bg1">
+                          <a:alpha val="80000"/>
+                        </a:schemeClr>
+                      </a:glow>
+                    </a:effectLst>
                     <a:latin typeface="Times New Roman" panose="02020603050405020304" pitchFamily="18" charset="0"/>
                     <a:cs typeface="Times New Roman" panose="02020603050405020304" pitchFamily="18" charset="0"/>
                   </a:rPr>
                 </a:br>
                 <a:r>
                   <a:rPr lang="en-US" altLang="ja-JP" sz="1400" dirty="0">
+                    <a:effectLst>
+                      <a:glow rad="101600">
+                        <a:schemeClr val="bg1">
+                          <a:alpha val="80000"/>
+                        </a:schemeClr>
+                      </a:glow>
+                    </a:effectLst>
                     <a:latin typeface="Times New Roman" panose="02020603050405020304" pitchFamily="18" charset="0"/>
                     <a:cs typeface="Times New Roman" panose="02020603050405020304" pitchFamily="18" charset="0"/>
                   </a:rPr>
                   <a:t>from a bag file</a:t>
                 </a:r>
                 <a:endParaRPr kumimoji="1" lang="ja-JP" altLang="en-US" sz="1400" dirty="0">
+                  <a:effectLst>
+                    <a:glow rad="101600">
+                      <a:schemeClr val="bg1">
+                        <a:alpha val="80000"/>
+                      </a:schemeClr>
+                    </a:glow>
+                  </a:effectLst>
                   <a:latin typeface="Times New Roman" panose="02020603050405020304" pitchFamily="18" charset="0"/>
                   <a:cs typeface="Times New Roman" panose="02020603050405020304" pitchFamily="18" charset="0"/>
                 </a:endParaRPr>
@@ -17263,6 +17767,13 @@
               <a:pPr algn="ctr"/>
               <a:r>
                 <a:rPr lang="en-US" altLang="ja-JP" sz="1400" baseline="30000" dirty="0">
+                  <a:effectLst>
+                    <a:glow rad="101600">
+                      <a:schemeClr val="bg1">
+                        <a:alpha val="80000"/>
+                      </a:schemeClr>
+                    </a:glow>
+                  </a:effectLst>
                   <a:latin typeface="Times New Roman" panose="02020603050405020304" pitchFamily="18" charset="0"/>
                   <a:cs typeface="Times New Roman" panose="02020603050405020304" pitchFamily="18" charset="0"/>
                 </a:rPr>
@@ -17270,6 +17781,13 @@
               </a:r>
               <a:r>
                 <a:rPr kumimoji="1" lang="en-US" altLang="ja-JP" sz="1400" dirty="0">
+                  <a:effectLst>
+                    <a:glow rad="101600">
+                      <a:schemeClr val="bg1">
+                        <a:alpha val="80000"/>
+                      </a:schemeClr>
+                    </a:glow>
+                  </a:effectLst>
                   <a:latin typeface="Times New Roman" panose="02020603050405020304" pitchFamily="18" charset="0"/>
                   <a:cs typeface="Times New Roman" panose="02020603050405020304" pitchFamily="18" charset="0"/>
                 </a:rPr>
@@ -17277,6 +17795,13 @@
               </a:r>
               <a:r>
                 <a:rPr lang="en-US" altLang="ja-JP" sz="1400" dirty="0" err="1">
+                  <a:effectLst>
+                    <a:glow rad="101600">
+                      <a:schemeClr val="bg1">
+                        <a:alpha val="80000"/>
+                      </a:schemeClr>
+                    </a:glow>
+                  </a:effectLst>
                   <a:latin typeface="Times New Roman" panose="02020603050405020304" pitchFamily="18" charset="0"/>
                   <a:cs typeface="Times New Roman" panose="02020603050405020304" pitchFamily="18" charset="0"/>
                 </a:rPr>
@@ -17284,12 +17809,26 @@
               </a:r>
               <a:r>
                 <a:rPr kumimoji="1" lang="en-US" altLang="ja-JP" sz="1400" dirty="0" err="1">
+                  <a:effectLst>
+                    <a:glow rad="101600">
+                      <a:schemeClr val="bg1">
+                        <a:alpha val="80000"/>
+                      </a:schemeClr>
+                    </a:glow>
+                  </a:effectLst>
                   <a:latin typeface="Times New Roman" panose="02020603050405020304" pitchFamily="18" charset="0"/>
                   <a:cs typeface="Times New Roman" panose="02020603050405020304" pitchFamily="18" charset="0"/>
                 </a:rPr>
                 <a:t>npaused</a:t>
               </a:r>
               <a:endParaRPr kumimoji="1" lang="ja-JP" altLang="en-US" sz="1400" dirty="0">
+                <a:effectLst>
+                  <a:glow rad="101600">
+                    <a:schemeClr val="bg1">
+                      <a:alpha val="80000"/>
+                    </a:schemeClr>
+                  </a:glow>
+                </a:effectLst>
                 <a:latin typeface="Times New Roman" panose="02020603050405020304" pitchFamily="18" charset="0"/>
                 <a:cs typeface="Times New Roman" panose="02020603050405020304" pitchFamily="18" charset="0"/>
               </a:endParaRPr>
@@ -17392,6 +17931,13 @@
                 <a:pPr algn="ctr"/>
                 <a:r>
                   <a:rPr kumimoji="1" lang="en-US" altLang="ja-JP" sz="1400" dirty="0">
+                    <a:effectLst>
+                      <a:glow rad="101600">
+                        <a:schemeClr val="bg1">
+                          <a:alpha val="80000"/>
+                        </a:schemeClr>
+                      </a:glow>
+                    </a:effectLst>
                     <a:latin typeface="Times New Roman" panose="02020603050405020304" pitchFamily="18" charset="0"/>
                     <a:cs typeface="Times New Roman" panose="02020603050405020304" pitchFamily="18" charset="0"/>
                   </a:rPr>
@@ -17399,12 +17945,26 @@
                 </a:r>
                 <a:r>
                   <a:rPr kumimoji="1" lang="en-US" altLang="ja-JP" sz="1400" dirty="0" err="1">
+                    <a:effectLst>
+                      <a:glow rad="101600">
+                        <a:schemeClr val="bg1">
+                          <a:alpha val="80000"/>
+                        </a:schemeClr>
+                      </a:glow>
+                    </a:effectLst>
                     <a:latin typeface="Times New Roman" panose="02020603050405020304" pitchFamily="18" charset="0"/>
                     <a:cs typeface="Times New Roman" panose="02020603050405020304" pitchFamily="18" charset="0"/>
                   </a:rPr>
                   <a:t>set_link_state</a:t>
                 </a:r>
                 <a:endParaRPr kumimoji="1" lang="ja-JP" altLang="en-US" sz="1400" dirty="0">
+                  <a:effectLst>
+                    <a:glow rad="101600">
+                      <a:schemeClr val="bg1">
+                        <a:alpha val="80000"/>
+                      </a:schemeClr>
+                    </a:glow>
+                  </a:effectLst>
                   <a:latin typeface="Times New Roman" panose="02020603050405020304" pitchFamily="18" charset="0"/>
                   <a:cs typeface="Times New Roman" panose="02020603050405020304" pitchFamily="18" charset="0"/>
                 </a:endParaRPr>

</xml_diff>

<commit_message>
use official github colors
</commit_message>
<xml_diff>
--- a/images/sequence_diagrams.pptx
+++ b/images/sequence_diagrams.pptx
@@ -8,11 +8,10 @@
     <p:sldMasterId id="2147483901" r:id="rId4"/>
   </p:sldMasterIdLst>
   <p:notesMasterIdLst>
-    <p:notesMasterId r:id="rId7"/>
+    <p:notesMasterId r:id="rId6"/>
   </p:notesMasterIdLst>
   <p:sldIdLst>
     <p:sldId id="961" r:id="rId5"/>
-    <p:sldId id="960" r:id="rId6"/>
   </p:sldIdLst>
   <p:sldSz cx="12192000" cy="6858000"/>
   <p:notesSz cx="6888163" cy="10018713"/>
@@ -517,6 +516,90 @@
     </a:lvl9pPr>
   </p:notesStyle>
 </p:notesMaster>
+</file>
+
+<file path=ppt/notesSlides/notesSlide1.xml><?xml version="1.0" encoding="utf-8"?>
+<p:notes xmlns:a="http://schemas.openxmlformats.org/drawingml/2006/main" xmlns:r="http://schemas.openxmlformats.org/officeDocument/2006/relationships" xmlns:p="http://schemas.openxmlformats.org/presentationml/2006/main">
+  <p:cSld>
+    <p:spTree>
+      <p:nvGrpSpPr>
+        <p:cNvPr id="1" name=""/>
+        <p:cNvGrpSpPr/>
+        <p:nvPr/>
+      </p:nvGrpSpPr>
+      <p:grpSpPr>
+        <a:xfrm>
+          <a:off x="0" y="0"/>
+          <a:ext cx="0" cy="0"/>
+          <a:chOff x="0" y="0"/>
+          <a:chExt cx="0" cy="0"/>
+        </a:xfrm>
+      </p:grpSpPr>
+      <p:sp>
+        <p:nvSpPr>
+          <p:cNvPr id="2" name="スライド イメージ プレースホルダー 1"/>
+          <p:cNvSpPr>
+            <a:spLocks noGrp="1" noRot="1" noChangeAspect="1"/>
+          </p:cNvSpPr>
+          <p:nvPr>
+            <p:ph type="sldImg"/>
+          </p:nvPr>
+        </p:nvSpPr>
+        <p:spPr/>
+      </p:sp>
+      <p:sp>
+        <p:nvSpPr>
+          <p:cNvPr id="3" name="ノート プレースホルダー 2"/>
+          <p:cNvSpPr>
+            <a:spLocks noGrp="1"/>
+          </p:cNvSpPr>
+          <p:nvPr>
+            <p:ph type="body" idx="1"/>
+          </p:nvPr>
+        </p:nvSpPr>
+        <p:spPr/>
+        <p:txBody>
+          <a:bodyPr/>
+          <a:lstStyle/>
+          <a:p>
+            <a:endParaRPr kumimoji="1" lang="ja-JP" altLang="en-US" dirty="0"/>
+          </a:p>
+        </p:txBody>
+      </p:sp>
+      <p:sp>
+        <p:nvSpPr>
+          <p:cNvPr id="4" name="スライド番号プレースホルダー 3"/>
+          <p:cNvSpPr>
+            <a:spLocks noGrp="1"/>
+          </p:cNvSpPr>
+          <p:nvPr>
+            <p:ph type="sldNum" sz="quarter" idx="5"/>
+          </p:nvPr>
+        </p:nvSpPr>
+        <p:spPr/>
+        <p:txBody>
+          <a:bodyPr/>
+          <a:lstStyle/>
+          <a:p>
+            <a:fld id="{13059307-0170-4CF3-BE94-26A87D744ACE}" type="slidenum">
+              <a:rPr kumimoji="1" lang="ja-JP" altLang="en-US" smtClean="0"/>
+              <a:t>0</a:t>
+            </a:fld>
+            <a:endParaRPr kumimoji="1" lang="ja-JP" altLang="en-US"/>
+          </a:p>
+        </p:txBody>
+      </p:sp>
+    </p:spTree>
+    <p:extLst>
+      <p:ext uri="{BB962C8B-B14F-4D97-AF65-F5344CB8AC3E}">
+        <p14:creationId xmlns:p14="http://schemas.microsoft.com/office/powerpoint/2010/main" val="274703319"/>
+      </p:ext>
+    </p:extLst>
+  </p:cSld>
+  <p:clrMapOvr>
+    <a:masterClrMapping/>
+  </p:clrMapOvr>
+</p:notes>
 </file>
 
 <file path=ppt/slideLayouts/slideLayout1.xml><?xml version="1.0" encoding="utf-8"?>
@@ -14591,8 +14674,8 @@
         </p:nvSpPr>
         <p:spPr>
           <a:xfrm>
-            <a:off x="6503032" y="0"/>
-            <a:ext cx="5694634" cy="6858000"/>
+            <a:off x="0" y="1"/>
+            <a:ext cx="12197666" cy="3416026"/>
           </a:xfrm>
           <a:prstGeom prst="rect">
             <a:avLst/>
@@ -14600,6 +14683,9 @@
           <a:solidFill>
             <a:srgbClr val="22272E"/>
           </a:solidFill>
+          <a:ln>
+            <a:noFill/>
+          </a:ln>
         </p:spPr>
         <p:style>
           <a:lnRef idx="2">
@@ -14626,36 +14712,6 @@
           </a:p>
         </p:txBody>
       </p:sp>
-      <p:sp>
-        <p:nvSpPr>
-          <p:cNvPr id="2" name="スライド番号プレースホルダー 1">
-            <a:extLst>
-              <a:ext uri="{FF2B5EF4-FFF2-40B4-BE49-F238E27FC236}">
-                <a16:creationId xmlns:a16="http://schemas.microsoft.com/office/drawing/2014/main" id="{B243121B-CA82-44F4-85C0-98CACE8AA726}"/>
-              </a:ext>
-            </a:extLst>
-          </p:cNvPr>
-          <p:cNvSpPr>
-            <a:spLocks noGrp="1"/>
-          </p:cNvSpPr>
-          <p:nvPr>
-            <p:ph type="sldNum" sz="quarter" idx="12"/>
-          </p:nvPr>
-        </p:nvSpPr>
-        <p:spPr/>
-        <p:txBody>
-          <a:bodyPr/>
-          <a:lstStyle/>
-          <a:p>
-            <a:fld id="{AB787E92-D314-4C67-8BD0-16EB3031DCCF}" type="slidenum">
-              <a:rPr lang="ja-JP" altLang="en-US" smtClean="0"/>
-              <a:pPr/>
-              <a:t>0</a:t>
-            </a:fld>
-            <a:endParaRPr lang="ja-JP" altLang="en-US" dirty="0"/>
-          </a:p>
-        </p:txBody>
-      </p:sp>
       <p:grpSp>
         <p:nvGrpSpPr>
           <p:cNvPr id="16" name="グループ化 15">
@@ -14670,7 +14726,7 @@
         </p:nvGrpSpPr>
         <p:grpSpPr>
           <a:xfrm>
-            <a:off x="711075" y="687343"/>
+            <a:off x="668966" y="563391"/>
             <a:ext cx="4977894" cy="5731219"/>
             <a:chOff x="282488" y="325677"/>
             <a:chExt cx="4977894" cy="5731219"/>
@@ -14696,6 +14752,14 @@
             <a:prstGeom prst="rect">
               <a:avLst/>
             </a:prstGeom>
+            <a:solidFill>
+              <a:srgbClr val="6A737D"/>
+            </a:solidFill>
+            <a:ln>
+              <a:solidFill>
+                <a:srgbClr val="2F363D"/>
+              </a:solidFill>
+            </a:ln>
           </p:spPr>
           <p:style>
             <a:lnRef idx="2">
@@ -14719,17 +14783,33 @@
             <a:p>
               <a:pPr algn="ctr"/>
               <a:r>
-                <a:rPr kumimoji="1" lang="en-US" altLang="ja-JP" sz="2000" b="1" dirty="0"/>
+                <a:rPr kumimoji="1" lang="en-US" altLang="ja-JP" sz="2000" b="1" dirty="0">
+                  <a:solidFill>
+                    <a:srgbClr val="F6F8FA"/>
+                  </a:solidFill>
+                </a:rPr>
                 <a:t>Gazebo</a:t>
               </a:r>
               <a:br>
-                <a:rPr kumimoji="1" lang="en-US" altLang="ja-JP" sz="2000" b="1" dirty="0"/>
+                <a:rPr kumimoji="1" lang="en-US" altLang="ja-JP" sz="2000" b="1" dirty="0">
+                  <a:solidFill>
+                    <a:srgbClr val="F6F8FA"/>
+                  </a:solidFill>
+                </a:rPr>
               </a:br>
               <a:r>
-                <a:rPr kumimoji="1" lang="en-US" altLang="ja-JP" sz="1400" b="1" dirty="0"/>
+                <a:rPr kumimoji="1" lang="en-US" altLang="ja-JP" sz="1400" b="1" dirty="0">
+                  <a:solidFill>
+                    <a:srgbClr val="F6F8FA"/>
+                  </a:solidFill>
+                </a:rPr>
                 <a:t>(w/ ROS API)</a:t>
               </a:r>
-              <a:endParaRPr kumimoji="1" lang="ja-JP" altLang="en-US" sz="1400" b="1" dirty="0"/>
+              <a:endParaRPr kumimoji="1" lang="ja-JP" altLang="en-US" sz="1400" b="1" dirty="0">
+                <a:solidFill>
+                  <a:srgbClr val="F6F8FA"/>
+                </a:solidFill>
+              </a:endParaRPr>
             </a:p>
           </p:txBody>
         </p:sp>
@@ -14755,7 +14835,11 @@
             <a:prstGeom prst="line">
               <a:avLst/>
             </a:prstGeom>
-            <a:ln w="57150"/>
+            <a:ln w="57150">
+              <a:solidFill>
+                <a:srgbClr val="6A737D"/>
+              </a:solidFill>
+            </a:ln>
           </p:spPr>
           <p:style>
             <a:lnRef idx="1">
@@ -14793,8 +14877,13 @@
               <a:avLst/>
             </a:prstGeom>
             <a:solidFill>
-              <a:schemeClr val="accent2"/>
+              <a:srgbClr val="0366D6"/>
             </a:solidFill>
+            <a:ln>
+              <a:solidFill>
+                <a:srgbClr val="2F363D"/>
+              </a:solidFill>
+            </a:ln>
           </p:spPr>
           <p:style>
             <a:lnRef idx="2">
@@ -14818,17 +14907,29 @@
             <a:p>
               <a:pPr algn="ctr"/>
               <a:r>
-                <a:rPr lang="en-US" altLang="ja-JP" sz="2000" b="1" dirty="0"/>
+                <a:rPr lang="en-US" altLang="ja-JP" sz="2000" b="1" dirty="0">
+                  <a:solidFill>
+                    <a:srgbClr val="F6F8FA"/>
+                  </a:solidFill>
+                </a:rPr>
                 <a:t>create_</a:t>
               </a:r>
             </a:p>
             <a:p>
               <a:pPr algn="ctr"/>
               <a:r>
-                <a:rPr kumimoji="1" lang="en-US" altLang="ja-JP" sz="2000" b="1" dirty="0"/>
+                <a:rPr kumimoji="1" lang="en-US" altLang="ja-JP" sz="2000" b="1" dirty="0">
+                  <a:solidFill>
+                    <a:srgbClr val="F6F8FA"/>
+                  </a:solidFill>
+                </a:rPr>
                 <a:t>snapshot</a:t>
               </a:r>
-              <a:endParaRPr kumimoji="1" lang="ja-JP" altLang="en-US" sz="2000" b="1" dirty="0"/>
+              <a:endParaRPr kumimoji="1" lang="ja-JP" altLang="en-US" sz="2000" b="1" dirty="0">
+                <a:solidFill>
+                  <a:srgbClr val="F6F8FA"/>
+                </a:solidFill>
+              </a:endParaRPr>
             </a:p>
           </p:txBody>
         </p:sp>
@@ -14856,7 +14957,7 @@
             </a:prstGeom>
             <a:ln w="57150">
               <a:solidFill>
-                <a:schemeClr val="accent2"/>
+                <a:srgbClr val="0366D6"/>
               </a:solidFill>
             </a:ln>
           </p:spPr>
@@ -14875,55 +14976,6 @@
             </a:fontRef>
           </p:style>
         </p:cxnSp>
-        <p:sp>
-          <p:nvSpPr>
-            <p:cNvPr id="13" name="正方形/長方形 12">
-              <a:extLst>
-                <a:ext uri="{FF2B5EF4-FFF2-40B4-BE49-F238E27FC236}">
-                  <a16:creationId xmlns:a16="http://schemas.microsoft.com/office/drawing/2014/main" id="{4E481F6F-8557-4546-B47D-661C038C204D}"/>
-                </a:ext>
-              </a:extLst>
-            </p:cNvPr>
-            <p:cNvSpPr/>
-            <p:nvPr/>
-          </p:nvSpPr>
-          <p:spPr>
-            <a:xfrm>
-              <a:off x="3837521" y="1778696"/>
-              <a:ext cx="727200" cy="3634307"/>
-            </a:xfrm>
-            <a:prstGeom prst="rect">
-              <a:avLst/>
-            </a:prstGeom>
-            <a:solidFill>
-              <a:schemeClr val="accent2"/>
-            </a:solidFill>
-          </p:spPr>
-          <p:style>
-            <a:lnRef idx="2">
-              <a:schemeClr val="accent1">
-                <a:shade val="50000"/>
-              </a:schemeClr>
-            </a:lnRef>
-            <a:fillRef idx="1">
-              <a:schemeClr val="accent1"/>
-            </a:fillRef>
-            <a:effectRef idx="0">
-              <a:schemeClr val="accent1"/>
-            </a:effectRef>
-            <a:fontRef idx="minor">
-              <a:schemeClr val="lt1"/>
-            </a:fontRef>
-          </p:style>
-          <p:txBody>
-            <a:bodyPr rtlCol="0" anchor="ctr"/>
-            <a:lstStyle/>
-            <a:p>
-              <a:pPr algn="ctr"/>
-              <a:endParaRPr kumimoji="1" lang="ja-JP" altLang="en-US" dirty="0"/>
-            </a:p>
-          </p:txBody>
-        </p:sp>
         <p:grpSp>
           <p:nvGrpSpPr>
             <p:cNvPr id="3" name="グループ化 2">
@@ -14968,7 +15020,7 @@
               </a:prstGeom>
               <a:ln w="57150">
                 <a:solidFill>
-                  <a:schemeClr val="accent2"/>
+                  <a:srgbClr val="0366D6"/>
                 </a:solidFill>
                 <a:headEnd type="none" w="med" len="med"/>
                 <a:tailEnd type="triangle" w="med" len="med"/>
@@ -15020,13 +15072,10 @@
                 <a:pPr algn="ctr"/>
                 <a:r>
                   <a:rPr kumimoji="1" lang="en-US" altLang="ja-JP" sz="1400" dirty="0">
-                    <a:effectLst>
-                      <a:glow rad="101600">
-                        <a:schemeClr val="bg1">
-                          <a:alpha val="80000"/>
-                        </a:schemeClr>
-                      </a:glow>
-                    </a:effectLst>
+                    <a:solidFill>
+                      <a:srgbClr val="6A737D"/>
+                    </a:solidFill>
+                    <a:effectLst/>
                     <a:latin typeface="Times New Roman" panose="02020603050405020304" pitchFamily="18" charset="0"/>
                     <a:cs typeface="Times New Roman" panose="02020603050405020304" pitchFamily="18" charset="0"/>
                   </a:rPr>
@@ -15034,13 +15083,10 @@
                 </a:r>
                 <a:r>
                   <a:rPr kumimoji="1" lang="en-US" altLang="ja-JP" sz="1400" dirty="0" err="1">
-                    <a:effectLst>
-                      <a:glow rad="101600">
-                        <a:schemeClr val="bg1">
-                          <a:alpha val="80000"/>
-                        </a:schemeClr>
-                      </a:glow>
-                    </a:effectLst>
+                    <a:solidFill>
+                      <a:srgbClr val="6A737D"/>
+                    </a:solidFill>
+                    <a:effectLst/>
                     <a:latin typeface="Times New Roman" panose="02020603050405020304" pitchFamily="18" charset="0"/>
                     <a:cs typeface="Times New Roman" panose="02020603050405020304" pitchFamily="18" charset="0"/>
                   </a:rPr>
@@ -15048,26 +15094,20 @@
                 </a:r>
                 <a:br>
                   <a:rPr kumimoji="1" lang="en-US" altLang="ja-JP" sz="1400" dirty="0">
-                    <a:effectLst>
-                      <a:glow rad="101600">
-                        <a:schemeClr val="bg1">
-                          <a:alpha val="80000"/>
-                        </a:schemeClr>
-                      </a:glow>
-                    </a:effectLst>
+                    <a:solidFill>
+                      <a:srgbClr val="6A737D"/>
+                    </a:solidFill>
+                    <a:effectLst/>
                     <a:latin typeface="Times New Roman" panose="02020603050405020304" pitchFamily="18" charset="0"/>
                     <a:cs typeface="Times New Roman" panose="02020603050405020304" pitchFamily="18" charset="0"/>
                   </a:rPr>
                 </a:br>
                 <a:r>
                   <a:rPr kumimoji="1" lang="en-US" altLang="ja-JP" sz="1400" dirty="0">
-                    <a:effectLst>
-                      <a:glow rad="101600">
-                        <a:schemeClr val="bg1">
-                          <a:alpha val="80000"/>
-                        </a:schemeClr>
-                      </a:glow>
-                    </a:effectLst>
+                    <a:solidFill>
+                      <a:srgbClr val="6A737D"/>
+                    </a:solidFill>
+                    <a:effectLst/>
                     <a:latin typeface="Times New Roman" panose="02020603050405020304" pitchFamily="18" charset="0"/>
                     <a:cs typeface="Times New Roman" panose="02020603050405020304" pitchFamily="18" charset="0"/>
                   </a:rPr>
@@ -15075,13 +15115,10 @@
                 </a:r>
                 <a:r>
                   <a:rPr lang="en-US" altLang="ja-JP" sz="1400" dirty="0">
-                    <a:effectLst>
-                      <a:glow rad="101600">
-                        <a:schemeClr val="bg1">
-                          <a:alpha val="80000"/>
-                        </a:schemeClr>
-                      </a:glow>
-                    </a:effectLst>
+                    <a:solidFill>
+                      <a:srgbClr val="6A737D"/>
+                    </a:solidFill>
+                    <a:effectLst/>
                     <a:latin typeface="Times New Roman" panose="02020603050405020304" pitchFamily="18" charset="0"/>
                     <a:cs typeface="Times New Roman" panose="02020603050405020304" pitchFamily="18" charset="0"/>
                   </a:rPr>
@@ -15089,13 +15126,10 @@
                 </a:r>
                 <a:r>
                   <a:rPr lang="ja-JP" altLang="en-US" sz="1400" dirty="0">
-                    <a:effectLst>
-                      <a:glow rad="101600">
-                        <a:schemeClr val="bg1">
-                          <a:alpha val="80000"/>
-                        </a:schemeClr>
-                      </a:glow>
-                    </a:effectLst>
+                    <a:solidFill>
+                      <a:srgbClr val="6A737D"/>
+                    </a:solidFill>
+                    <a:effectLst/>
                     <a:latin typeface="Times New Roman" panose="02020603050405020304" pitchFamily="18" charset="0"/>
                     <a:cs typeface="Times New Roman" panose="02020603050405020304" pitchFamily="18" charset="0"/>
                   </a:rPr>
@@ -15103,13 +15137,10 @@
                 </a:r>
                 <a:r>
                   <a:rPr lang="en-US" altLang="ja-JP" sz="1400" dirty="0">
-                    <a:effectLst>
-                      <a:glow rad="101600">
-                        <a:schemeClr val="bg1">
-                          <a:alpha val="80000"/>
-                        </a:schemeClr>
-                      </a:glow>
-                    </a:effectLst>
+                    <a:solidFill>
+                      <a:srgbClr val="6A737D"/>
+                    </a:solidFill>
+                    <a:effectLst/>
                     <a:latin typeface="Times New Roman" panose="02020603050405020304" pitchFamily="18" charset="0"/>
                     <a:cs typeface="Times New Roman" panose="02020603050405020304" pitchFamily="18" charset="0"/>
                   </a:rPr>
@@ -15117,13 +15148,10 @@
                 </a:r>
                 <a:r>
                   <a:rPr lang="ja-JP" altLang="en-US" sz="1400" dirty="0">
-                    <a:effectLst>
-                      <a:glow rad="101600">
-                        <a:schemeClr val="bg1">
-                          <a:alpha val="80000"/>
-                        </a:schemeClr>
-                      </a:glow>
-                    </a:effectLst>
+                    <a:solidFill>
+                      <a:srgbClr val="6A737D"/>
+                    </a:solidFill>
+                    <a:effectLst/>
                     <a:latin typeface="Times New Roman" panose="02020603050405020304" pitchFamily="18" charset="0"/>
                     <a:cs typeface="Times New Roman" panose="02020603050405020304" pitchFamily="18" charset="0"/>
                   </a:rPr>
@@ -15131,13 +15159,10 @@
                 </a:r>
                 <a:r>
                   <a:rPr lang="en-US" altLang="ja-JP" sz="1400" dirty="0">
-                    <a:effectLst>
-                      <a:glow rad="101600">
-                        <a:schemeClr val="bg1">
-                          <a:alpha val="80000"/>
-                        </a:schemeClr>
-                      </a:glow>
-                    </a:effectLst>
+                    <a:solidFill>
+                      <a:srgbClr val="6A737D"/>
+                    </a:solidFill>
+                    <a:effectLst/>
                     <a:latin typeface="Times New Roman" panose="02020603050405020304" pitchFamily="18" charset="0"/>
                     <a:cs typeface="Times New Roman" panose="02020603050405020304" pitchFamily="18" charset="0"/>
                   </a:rPr>
@@ -15145,26 +15170,20 @@
                 </a:r>
                 <a:r>
                   <a:rPr kumimoji="1" lang="en-US" altLang="ja-JP" sz="1400" dirty="0">
-                    <a:effectLst>
-                      <a:glow rad="101600">
-                        <a:schemeClr val="bg1">
-                          <a:alpha val="80000"/>
-                        </a:schemeClr>
-                      </a:glow>
-                    </a:effectLst>
+                    <a:solidFill>
+                      <a:srgbClr val="6A737D"/>
+                    </a:solidFill>
+                    <a:effectLst/>
                     <a:latin typeface="Times New Roman" panose="02020603050405020304" pitchFamily="18" charset="0"/>
                     <a:cs typeface="Times New Roman" panose="02020603050405020304" pitchFamily="18" charset="0"/>
                   </a:rPr>
                   <a:t>)</a:t>
                 </a:r>
                 <a:endParaRPr kumimoji="1" lang="ja-JP" altLang="en-US" sz="1400" dirty="0">
-                  <a:effectLst>
-                    <a:glow rad="101600">
-                      <a:schemeClr val="bg1">
-                        <a:alpha val="80000"/>
-                      </a:schemeClr>
-                    </a:glow>
-                  </a:effectLst>
+                  <a:solidFill>
+                    <a:srgbClr val="6A737D"/>
+                  </a:solidFill>
+                  <a:effectLst/>
                   <a:latin typeface="Times New Roman" panose="02020603050405020304" pitchFamily="18" charset="0"/>
                   <a:cs typeface="Times New Roman" panose="02020603050405020304" pitchFamily="18" charset="0"/>
                 </a:endParaRPr>
@@ -15192,6 +15211,9 @@
                 <a:avLst/>
               </a:prstGeom>
               <a:ln w="57150">
+                <a:solidFill>
+                  <a:srgbClr val="6A737D"/>
+                </a:solidFill>
                 <a:prstDash val="sysDash"/>
                 <a:headEnd type="none" w="med" len="med"/>
                 <a:tailEnd type="triangle" w="med" len="med"/>
@@ -15232,6 +15254,14 @@
               <a:prstGeom prst="rect">
                 <a:avLst/>
               </a:prstGeom>
+              <a:solidFill>
+                <a:srgbClr val="6A737D"/>
+              </a:solidFill>
+              <a:ln>
+                <a:solidFill>
+                  <a:srgbClr val="2F363D"/>
+                </a:solidFill>
+              </a:ln>
             </p:spPr>
             <p:style>
               <a:lnRef idx="2">
@@ -15303,7 +15333,7 @@
               </a:prstGeom>
               <a:ln w="57150">
                 <a:solidFill>
-                  <a:schemeClr val="accent2"/>
+                  <a:srgbClr val="0366D6"/>
                 </a:solidFill>
                 <a:headEnd type="none" w="med" len="med"/>
                 <a:tailEnd type="triangle" w="med" len="med"/>
@@ -15355,13 +15385,10 @@
                 <a:pPr algn="ctr"/>
                 <a:r>
                   <a:rPr kumimoji="1" lang="en-US" altLang="ja-JP" sz="1400" dirty="0">
-                    <a:effectLst>
-                      <a:glow rad="101600">
-                        <a:schemeClr val="bg1">
-                          <a:alpha val="80000"/>
-                        </a:schemeClr>
-                      </a:glow>
-                    </a:effectLst>
+                    <a:solidFill>
+                      <a:srgbClr val="6A737D"/>
+                    </a:solidFill>
+                    <a:effectLst/>
                     <a:latin typeface="Times New Roman" panose="02020603050405020304" pitchFamily="18" charset="0"/>
                     <a:cs typeface="Times New Roman" panose="02020603050405020304" pitchFamily="18" charset="0"/>
                   </a:rPr>
@@ -15369,13 +15396,10 @@
                 </a:r>
                 <a:r>
                   <a:rPr kumimoji="1" lang="en-US" altLang="ja-JP" sz="1400" dirty="0" err="1">
-                    <a:effectLst>
-                      <a:glow rad="101600">
-                        <a:schemeClr val="bg1">
-                          <a:alpha val="80000"/>
-                        </a:schemeClr>
-                      </a:glow>
-                    </a:effectLst>
+                    <a:solidFill>
+                      <a:srgbClr val="6A737D"/>
+                    </a:solidFill>
+                    <a:effectLst/>
                     <a:latin typeface="Times New Roman" panose="02020603050405020304" pitchFamily="18" charset="0"/>
                     <a:cs typeface="Times New Roman" panose="02020603050405020304" pitchFamily="18" charset="0"/>
                   </a:rPr>
@@ -15383,13 +15407,10 @@
                 </a:r>
                 <a:r>
                   <a:rPr lang="en-US" altLang="ja-JP" sz="1400" dirty="0" err="1">
-                    <a:effectLst>
-                      <a:glow rad="101600">
-                        <a:schemeClr val="bg1">
-                          <a:alpha val="80000"/>
-                        </a:schemeClr>
-                      </a:glow>
-                    </a:effectLst>
+                    <a:solidFill>
+                      <a:srgbClr val="6A737D"/>
+                    </a:solidFill>
+                    <a:effectLst/>
                     <a:latin typeface="Times New Roman" panose="02020603050405020304" pitchFamily="18" charset="0"/>
                     <a:cs typeface="Times New Roman" panose="02020603050405020304" pitchFamily="18" charset="0"/>
                   </a:rPr>
@@ -15397,13 +15418,10 @@
                 </a:r>
                 <a:r>
                   <a:rPr kumimoji="1" lang="en-US" altLang="ja-JP" sz="1400" dirty="0" err="1">
-                    <a:effectLst>
-                      <a:glow rad="101600">
-                        <a:schemeClr val="bg1">
-                          <a:alpha val="80000"/>
-                        </a:schemeClr>
-                      </a:glow>
-                    </a:effectLst>
+                    <a:solidFill>
+                      <a:srgbClr val="6A737D"/>
+                    </a:solidFill>
+                    <a:effectLst/>
                     <a:latin typeface="Times New Roman" panose="02020603050405020304" pitchFamily="18" charset="0"/>
                     <a:cs typeface="Times New Roman" panose="02020603050405020304" pitchFamily="18" charset="0"/>
                   </a:rPr>
@@ -15411,26 +15429,20 @@
                 </a:r>
                 <a:r>
                   <a:rPr lang="en-US" altLang="ja-JP" sz="1400" baseline="30000" dirty="0">
-                    <a:effectLst>
-                      <a:glow rad="101600">
-                        <a:schemeClr val="bg1">
-                          <a:alpha val="80000"/>
-                        </a:schemeClr>
-                      </a:glow>
-                    </a:effectLst>
+                    <a:solidFill>
+                      <a:srgbClr val="6A737D"/>
+                    </a:solidFill>
+                    <a:effectLst/>
                     <a:latin typeface="Times New Roman" panose="02020603050405020304" pitchFamily="18" charset="0"/>
                     <a:cs typeface="Times New Roman" panose="02020603050405020304" pitchFamily="18" charset="0"/>
                   </a:rPr>
                   <a:t>*</a:t>
                 </a:r>
                 <a:endParaRPr kumimoji="1" lang="ja-JP" altLang="en-US" sz="1400" baseline="30000" dirty="0">
-                  <a:effectLst>
-                    <a:glow rad="101600">
-                      <a:schemeClr val="bg1">
-                        <a:alpha val="80000"/>
-                      </a:schemeClr>
-                    </a:glow>
-                  </a:effectLst>
+                  <a:solidFill>
+                    <a:srgbClr val="6A737D"/>
+                  </a:solidFill>
+                  <a:effectLst/>
                   <a:latin typeface="Times New Roman" panose="02020603050405020304" pitchFamily="18" charset="0"/>
                   <a:cs typeface="Times New Roman" panose="02020603050405020304" pitchFamily="18" charset="0"/>
                 </a:endParaRPr>
@@ -15458,6 +15470,9 @@
                 <a:avLst/>
               </a:prstGeom>
               <a:ln w="57150">
+                <a:solidFill>
+                  <a:srgbClr val="6A737D"/>
+                </a:solidFill>
                 <a:prstDash val="sysDash"/>
                 <a:headEnd type="none" w="med" len="med"/>
                 <a:tailEnd type="triangle" w="med" len="med"/>
@@ -15498,6 +15513,14 @@
               <a:prstGeom prst="rect">
                 <a:avLst/>
               </a:prstGeom>
+              <a:solidFill>
+                <a:srgbClr val="6A737D"/>
+              </a:solidFill>
+              <a:ln>
+                <a:solidFill>
+                  <a:srgbClr val="2F363D"/>
+                </a:solidFill>
+              </a:ln>
             </p:spPr>
             <p:style>
               <a:lnRef idx="2">
@@ -15569,7 +15592,7 @@
               </a:prstGeom>
               <a:ln w="57150">
                 <a:solidFill>
-                  <a:schemeClr val="accent2"/>
+                  <a:srgbClr val="0366D6"/>
                 </a:solidFill>
                 <a:headEnd type="none" w="med" len="med"/>
                 <a:tailEnd type="triangle" w="med" len="med"/>
@@ -15621,13 +15644,10 @@
                 <a:pPr algn="ctr"/>
                 <a:r>
                   <a:rPr kumimoji="1" lang="en-US" altLang="ja-JP" sz="1400" dirty="0">
-                    <a:effectLst>
-                      <a:glow rad="101600">
-                        <a:schemeClr val="bg1">
-                          <a:alpha val="80000"/>
-                        </a:schemeClr>
-                      </a:glow>
-                    </a:effectLst>
+                    <a:solidFill>
+                      <a:srgbClr val="6A737D"/>
+                    </a:solidFill>
+                    <a:effectLst/>
                     <a:latin typeface="Times New Roman" panose="02020603050405020304" pitchFamily="18" charset="0"/>
                     <a:cs typeface="Times New Roman" panose="02020603050405020304" pitchFamily="18" charset="0"/>
                   </a:rPr>
@@ -15635,13 +15655,10 @@
                 </a:r>
                 <a:r>
                   <a:rPr lang="en-US" altLang="ja-JP" sz="1400" dirty="0" err="1">
-                    <a:effectLst>
-                      <a:glow rad="101600">
-                        <a:schemeClr val="bg1">
-                          <a:alpha val="80000"/>
-                        </a:schemeClr>
-                      </a:glow>
-                    </a:effectLst>
+                    <a:solidFill>
+                      <a:srgbClr val="6A737D"/>
+                    </a:solidFill>
+                    <a:effectLst/>
                     <a:latin typeface="Times New Roman" panose="02020603050405020304" pitchFamily="18" charset="0"/>
                     <a:cs typeface="Times New Roman" panose="02020603050405020304" pitchFamily="18" charset="0"/>
                   </a:rPr>
@@ -15649,13 +15666,10 @@
                 </a:r>
                 <a:r>
                   <a:rPr kumimoji="1" lang="en-US" altLang="ja-JP" sz="1400" dirty="0" err="1">
-                    <a:effectLst>
-                      <a:glow rad="101600">
-                        <a:schemeClr val="bg1">
-                          <a:alpha val="80000"/>
-                        </a:schemeClr>
-                      </a:glow>
-                    </a:effectLst>
+                    <a:solidFill>
+                      <a:srgbClr val="6A737D"/>
+                    </a:solidFill>
+                    <a:effectLst/>
                     <a:latin typeface="Times New Roman" panose="02020603050405020304" pitchFamily="18" charset="0"/>
                     <a:cs typeface="Times New Roman" panose="02020603050405020304" pitchFamily="18" charset="0"/>
                   </a:rPr>
@@ -15663,26 +15677,20 @@
                 </a:r>
                 <a:r>
                   <a:rPr lang="en-US" altLang="ja-JP" sz="1400" baseline="30000" dirty="0">
-                    <a:effectLst>
-                      <a:glow rad="101600">
-                        <a:schemeClr val="bg1">
-                          <a:alpha val="80000"/>
-                        </a:schemeClr>
-                      </a:glow>
-                    </a:effectLst>
+                    <a:solidFill>
+                      <a:srgbClr val="6A737D"/>
+                    </a:solidFill>
+                    <a:effectLst/>
                     <a:latin typeface="Times New Roman" panose="02020603050405020304" pitchFamily="18" charset="0"/>
                     <a:cs typeface="Times New Roman" panose="02020603050405020304" pitchFamily="18" charset="0"/>
                   </a:rPr>
                   <a:t>*</a:t>
                 </a:r>
                 <a:endParaRPr kumimoji="1" lang="ja-JP" altLang="en-US" sz="1400" dirty="0">
-                  <a:effectLst>
-                    <a:glow rad="101600">
-                      <a:schemeClr val="bg1">
-                        <a:alpha val="80000"/>
-                      </a:schemeClr>
-                    </a:glow>
-                  </a:effectLst>
+                  <a:solidFill>
+                    <a:srgbClr val="6A737D"/>
+                  </a:solidFill>
+                  <a:effectLst/>
                   <a:latin typeface="Times New Roman" panose="02020603050405020304" pitchFamily="18" charset="0"/>
                   <a:cs typeface="Times New Roman" panose="02020603050405020304" pitchFamily="18" charset="0"/>
                 </a:endParaRPr>
@@ -15710,6 +15718,9 @@
                 <a:avLst/>
               </a:prstGeom>
               <a:ln w="57150">
+                <a:solidFill>
+                  <a:srgbClr val="6A737D"/>
+                </a:solidFill>
                 <a:prstDash val="sysDash"/>
                 <a:headEnd type="none" w="med" len="med"/>
                 <a:tailEnd type="triangle" w="med" len="med"/>
@@ -15750,6 +15761,14 @@
               <a:prstGeom prst="rect">
                 <a:avLst/>
               </a:prstGeom>
+              <a:solidFill>
+                <a:srgbClr val="6A737D"/>
+              </a:solidFill>
+              <a:ln>
+                <a:solidFill>
+                  <a:srgbClr val="2F363D"/>
+                </a:solidFill>
+              </a:ln>
             </p:spPr>
             <p:style>
               <a:lnRef idx="2">
@@ -15820,6 +15839,9 @@
                 <a:avLst/>
               </a:prstGeom>
               <a:ln w="57150">
+                <a:solidFill>
+                  <a:srgbClr val="0366D6"/>
+                </a:solidFill>
                 <a:prstDash val="solid"/>
                 <a:headEnd type="none" w="med" len="med"/>
                 <a:tailEnd type="triangle" w="med" len="med"/>
@@ -15863,6 +15885,9 @@
                 <a:avLst/>
               </a:prstGeom>
               <a:ln w="57150">
+                <a:solidFill>
+                  <a:srgbClr val="0366D6"/>
+                </a:solidFill>
                 <a:prstDash val="solid"/>
                 <a:headEnd type="none" w="med" len="med"/>
                 <a:tailEnd type="none" w="med" len="med"/>
@@ -15906,6 +15931,9 @@
                 <a:avLst/>
               </a:prstGeom>
               <a:ln w="57150">
+                <a:solidFill>
+                  <a:srgbClr val="0366D6"/>
+                </a:solidFill>
                 <a:prstDash val="solid"/>
                 <a:headEnd type="none" w="med" len="med"/>
                 <a:tailEnd type="none" w="med" len="med"/>
@@ -15957,13 +15985,10 @@
                 <a:pPr algn="r"/>
                 <a:r>
                   <a:rPr lang="en-US" altLang="ja-JP" sz="1400" dirty="0">
-                    <a:effectLst>
-                      <a:glow rad="101600">
-                        <a:schemeClr val="bg1">
-                          <a:alpha val="80000"/>
-                        </a:schemeClr>
-                      </a:glow>
-                    </a:effectLst>
+                    <a:solidFill>
+                      <a:srgbClr val="6A737D"/>
+                    </a:solidFill>
+                    <a:effectLst/>
                     <a:latin typeface="Times New Roman" panose="02020603050405020304" pitchFamily="18" charset="0"/>
                     <a:cs typeface="Times New Roman" panose="02020603050405020304" pitchFamily="18" charset="0"/>
                   </a:rPr>
@@ -15971,39 +15996,30 @@
                 </a:r>
                 <a:br>
                   <a:rPr lang="en-US" altLang="ja-JP" sz="1400" dirty="0">
-                    <a:effectLst>
-                      <a:glow rad="101600">
-                        <a:schemeClr val="bg1">
-                          <a:alpha val="80000"/>
-                        </a:schemeClr>
-                      </a:glow>
-                    </a:effectLst>
+                    <a:solidFill>
+                      <a:srgbClr val="6A737D"/>
+                    </a:solidFill>
+                    <a:effectLst/>
                     <a:latin typeface="Times New Roman" panose="02020603050405020304" pitchFamily="18" charset="0"/>
                     <a:cs typeface="Times New Roman" panose="02020603050405020304" pitchFamily="18" charset="0"/>
                   </a:rPr>
                 </a:br>
                 <a:r>
                   <a:rPr lang="en-US" altLang="ja-JP" sz="1400" dirty="0">
-                    <a:effectLst>
-                      <a:glow rad="101600">
-                        <a:schemeClr val="bg1">
-                          <a:alpha val="80000"/>
-                        </a:schemeClr>
-                      </a:glow>
-                    </a:effectLst>
+                    <a:solidFill>
+                      <a:srgbClr val="6A737D"/>
+                    </a:solidFill>
+                    <a:effectLst/>
                     <a:latin typeface="Times New Roman" panose="02020603050405020304" pitchFamily="18" charset="0"/>
                     <a:cs typeface="Times New Roman" panose="02020603050405020304" pitchFamily="18" charset="0"/>
                   </a:rPr>
                   <a:t>to a bag file</a:t>
                 </a:r>
                 <a:endParaRPr kumimoji="1" lang="ja-JP" altLang="en-US" sz="1400" dirty="0">
-                  <a:effectLst>
-                    <a:glow rad="101600">
-                      <a:schemeClr val="bg1">
-                        <a:alpha val="80000"/>
-                      </a:schemeClr>
-                    </a:glow>
-                  </a:effectLst>
+                  <a:solidFill>
+                    <a:srgbClr val="6A737D"/>
+                  </a:solidFill>
+                  <a:effectLst/>
                   <a:latin typeface="Times New Roman" panose="02020603050405020304" pitchFamily="18" charset="0"/>
                   <a:cs typeface="Times New Roman" panose="02020603050405020304" pitchFamily="18" charset="0"/>
                 </a:endParaRPr>
@@ -16042,13 +16058,10 @@
               <a:pPr algn="ctr"/>
               <a:r>
                 <a:rPr lang="en-US" altLang="ja-JP" sz="1400" baseline="30000" dirty="0">
-                  <a:effectLst>
-                    <a:glow rad="101600">
-                      <a:schemeClr val="bg1">
-                        <a:alpha val="80000"/>
-                      </a:schemeClr>
-                    </a:glow>
-                  </a:effectLst>
+                  <a:solidFill>
+                    <a:srgbClr val="6A737D"/>
+                  </a:solidFill>
+                  <a:effectLst/>
                   <a:latin typeface="Times New Roman" panose="02020603050405020304" pitchFamily="18" charset="0"/>
                   <a:cs typeface="Times New Roman" panose="02020603050405020304" pitchFamily="18" charset="0"/>
                 </a:rPr>
@@ -16056,26 +16069,20 @@
               </a:r>
               <a:r>
                 <a:rPr kumimoji="1" lang="en-US" altLang="ja-JP" sz="1400" dirty="0">
-                  <a:effectLst>
-                    <a:glow rad="101600">
-                      <a:schemeClr val="bg1">
-                        <a:alpha val="80000"/>
-                      </a:schemeClr>
-                    </a:glow>
-                  </a:effectLst>
+                  <a:solidFill>
+                    <a:srgbClr val="6A737D"/>
+                  </a:solidFill>
+                  <a:effectLst/>
                   <a:latin typeface="Times New Roman" panose="02020603050405020304" pitchFamily="18" charset="0"/>
                   <a:cs typeface="Times New Roman" panose="02020603050405020304" pitchFamily="18" charset="0"/>
                 </a:rPr>
                 <a:t>Called only if Gazebo is initially paused</a:t>
               </a:r>
               <a:endParaRPr kumimoji="1" lang="ja-JP" altLang="en-US" sz="1400" dirty="0">
-                <a:effectLst>
-                  <a:glow rad="101600">
-                    <a:schemeClr val="bg1">
-                      <a:alpha val="80000"/>
-                    </a:schemeClr>
-                  </a:glow>
-                </a:effectLst>
+                <a:solidFill>
+                  <a:srgbClr val="6A737D"/>
+                </a:solidFill>
+                <a:effectLst/>
                 <a:latin typeface="Times New Roman" panose="02020603050405020304" pitchFamily="18" charset="0"/>
                 <a:cs typeface="Times New Roman" panose="02020603050405020304" pitchFamily="18" charset="0"/>
               </a:endParaRPr>
@@ -16133,13 +16140,10 @@
                 <a:pPr algn="ctr"/>
                 <a:r>
                   <a:rPr kumimoji="1" lang="en-US" altLang="ja-JP" sz="1400" dirty="0">
-                    <a:effectLst>
-                      <a:glow rad="101600">
-                        <a:schemeClr val="bg1">
-                          <a:alpha val="80000"/>
-                        </a:schemeClr>
-                      </a:glow>
-                    </a:effectLst>
+                    <a:solidFill>
+                      <a:srgbClr val="6A737D"/>
+                    </a:solidFill>
+                    <a:effectLst/>
                     <a:latin typeface="Times New Roman" panose="02020603050405020304" pitchFamily="18" charset="0"/>
                     <a:cs typeface="Times New Roman" panose="02020603050405020304" pitchFamily="18" charset="0"/>
                   </a:rPr>
@@ -16147,26 +16151,20 @@
                 </a:r>
                 <a:r>
                   <a:rPr kumimoji="1" lang="en-US" altLang="ja-JP" sz="1400" dirty="0" err="1">
-                    <a:effectLst>
-                      <a:glow rad="101600">
-                        <a:schemeClr val="bg1">
-                          <a:alpha val="80000"/>
-                        </a:schemeClr>
-                      </a:glow>
-                    </a:effectLst>
+                    <a:solidFill>
+                      <a:srgbClr val="6A737D"/>
+                    </a:solidFill>
+                    <a:effectLst/>
                     <a:latin typeface="Times New Roman" panose="02020603050405020304" pitchFamily="18" charset="0"/>
                     <a:cs typeface="Times New Roman" panose="02020603050405020304" pitchFamily="18" charset="0"/>
                   </a:rPr>
                   <a:t>link_states</a:t>
                 </a:r>
                 <a:endParaRPr kumimoji="1" lang="ja-JP" altLang="en-US" sz="1400" dirty="0">
-                  <a:effectLst>
-                    <a:glow rad="101600">
-                      <a:schemeClr val="bg1">
-                        <a:alpha val="80000"/>
-                      </a:schemeClr>
-                    </a:glow>
-                  </a:effectLst>
+                  <a:solidFill>
+                    <a:srgbClr val="6A737D"/>
+                  </a:solidFill>
+                  <a:effectLst/>
                   <a:latin typeface="Times New Roman" panose="02020603050405020304" pitchFamily="18" charset="0"/>
                   <a:cs typeface="Times New Roman" panose="02020603050405020304" pitchFamily="18" charset="0"/>
                 </a:endParaRPr>
@@ -16196,6 +16194,9 @@
                 <a:avLst/>
               </a:prstGeom>
               <a:ln w="57150">
+                <a:solidFill>
+                  <a:srgbClr val="6A737D"/>
+                </a:solidFill>
                 <a:prstDash val="solid"/>
                 <a:headEnd type="none" w="med" len="med"/>
                 <a:tailEnd type="triangle" w="med" len="med"/>
@@ -16236,6 +16237,14 @@
               <a:prstGeom prst="rect">
                 <a:avLst/>
               </a:prstGeom>
+              <a:solidFill>
+                <a:srgbClr val="6A737D"/>
+              </a:solidFill>
+              <a:ln>
+                <a:solidFill>
+                  <a:srgbClr val="2F363D"/>
+                </a:solidFill>
+              </a:ln>
             </p:spPr>
             <p:style>
               <a:lnRef idx="2">
@@ -16263,343 +16272,6 @@
             </p:txBody>
           </p:sp>
         </p:grpSp>
-      </p:grpSp>
-    </p:spTree>
-    <p:extLst>
-      <p:ext uri="{BB962C8B-B14F-4D97-AF65-F5344CB8AC3E}">
-        <p14:creationId xmlns:p14="http://schemas.microsoft.com/office/powerpoint/2010/main" val="762006918"/>
-      </p:ext>
-    </p:extLst>
-  </p:cSld>
-  <p:clrMapOvr>
-    <a:masterClrMapping/>
-  </p:clrMapOvr>
-</p:sld>
-</file>
-
-<file path=ppt/slides/slide2.xml><?xml version="1.0" encoding="utf-8"?>
-<p:sld xmlns:a="http://schemas.openxmlformats.org/drawingml/2006/main" xmlns:r="http://schemas.openxmlformats.org/officeDocument/2006/relationships" xmlns:p="http://schemas.openxmlformats.org/presentationml/2006/main">
-  <p:cSld>
-    <p:spTree>
-      <p:nvGrpSpPr>
-        <p:cNvPr id="1" name=""/>
-        <p:cNvGrpSpPr/>
-        <p:nvPr/>
-      </p:nvGrpSpPr>
-      <p:grpSpPr>
-        <a:xfrm>
-          <a:off x="0" y="0"/>
-          <a:ext cx="0" cy="0"/>
-          <a:chOff x="0" y="0"/>
-          <a:chExt cx="0" cy="0"/>
-        </a:xfrm>
-      </p:grpSpPr>
-      <p:sp>
-        <p:nvSpPr>
-          <p:cNvPr id="37" name="正方形/長方形 36">
-            <a:extLst>
-              <a:ext uri="{FF2B5EF4-FFF2-40B4-BE49-F238E27FC236}">
-                <a16:creationId xmlns:a16="http://schemas.microsoft.com/office/drawing/2014/main" id="{68169EA6-AF28-4C9C-B08A-296BAA343A28}"/>
-              </a:ext>
-            </a:extLst>
-          </p:cNvPr>
-          <p:cNvSpPr/>
-          <p:nvPr/>
-        </p:nvSpPr>
-        <p:spPr>
-          <a:xfrm>
-            <a:off x="6497352" y="0"/>
-            <a:ext cx="5694634" cy="6858000"/>
-          </a:xfrm>
-          <a:prstGeom prst="rect">
-            <a:avLst/>
-          </a:prstGeom>
-          <a:solidFill>
-            <a:srgbClr val="22272E"/>
-          </a:solidFill>
-        </p:spPr>
-        <p:style>
-          <a:lnRef idx="2">
-            <a:schemeClr val="accent1">
-              <a:shade val="50000"/>
-            </a:schemeClr>
-          </a:lnRef>
-          <a:fillRef idx="1">
-            <a:schemeClr val="accent1"/>
-          </a:fillRef>
-          <a:effectRef idx="0">
-            <a:schemeClr val="accent1"/>
-          </a:effectRef>
-          <a:fontRef idx="minor">
-            <a:schemeClr val="lt1"/>
-          </a:fontRef>
-        </p:style>
-        <p:txBody>
-          <a:bodyPr rtlCol="0" anchor="ctr"/>
-          <a:lstStyle/>
-          <a:p>
-            <a:pPr algn="ctr"/>
-            <a:endParaRPr kumimoji="1" lang="ja-JP" altLang="en-US"/>
-          </a:p>
-        </p:txBody>
-      </p:sp>
-      <p:sp>
-        <p:nvSpPr>
-          <p:cNvPr id="2" name="スライド番号プレースホルダー 1">
-            <a:extLst>
-              <a:ext uri="{FF2B5EF4-FFF2-40B4-BE49-F238E27FC236}">
-                <a16:creationId xmlns:a16="http://schemas.microsoft.com/office/drawing/2014/main" id="{B243121B-CA82-44F4-85C0-98CACE8AA726}"/>
-              </a:ext>
-            </a:extLst>
-          </p:cNvPr>
-          <p:cNvSpPr>
-            <a:spLocks noGrp="1"/>
-          </p:cNvSpPr>
-          <p:nvPr>
-            <p:ph type="sldNum" sz="quarter" idx="12"/>
-          </p:nvPr>
-        </p:nvSpPr>
-        <p:spPr/>
-        <p:txBody>
-          <a:bodyPr/>
-          <a:lstStyle/>
-          <a:p>
-            <a:fld id="{AB787E92-D314-4C67-8BD0-16EB3031DCCF}" type="slidenum">
-              <a:rPr lang="ja-JP" altLang="en-US" smtClean="0"/>
-              <a:pPr/>
-              <a:t>1</a:t>
-            </a:fld>
-            <a:endParaRPr lang="ja-JP" altLang="en-US" dirty="0"/>
-          </a:p>
-        </p:txBody>
-      </p:sp>
-      <p:grpSp>
-        <p:nvGrpSpPr>
-          <p:cNvPr id="14" name="グループ化 13">
-            <a:extLst>
-              <a:ext uri="{FF2B5EF4-FFF2-40B4-BE49-F238E27FC236}">
-                <a16:creationId xmlns:a16="http://schemas.microsoft.com/office/drawing/2014/main" id="{2FEF0CA8-A5A2-4686-B305-1B5D968A8148}"/>
-              </a:ext>
-            </a:extLst>
-          </p:cNvPr>
-          <p:cNvGrpSpPr/>
-          <p:nvPr/>
-        </p:nvGrpSpPr>
-        <p:grpSpPr>
-          <a:xfrm>
-            <a:off x="611335" y="248656"/>
-            <a:ext cx="4977894" cy="6290256"/>
-            <a:chOff x="282488" y="325677"/>
-            <a:chExt cx="4977894" cy="6290256"/>
-          </a:xfrm>
-        </p:grpSpPr>
-        <p:sp>
-          <p:nvSpPr>
-            <p:cNvPr id="4" name="正方形/長方形 3">
-              <a:extLst>
-                <a:ext uri="{FF2B5EF4-FFF2-40B4-BE49-F238E27FC236}">
-                  <a16:creationId xmlns:a16="http://schemas.microsoft.com/office/drawing/2014/main" id="{47223AFD-0996-4DE6-9D18-F3195FA3CEA0}"/>
-                </a:ext>
-              </a:extLst>
-            </p:cNvPr>
-            <p:cNvSpPr/>
-            <p:nvPr/>
-          </p:nvSpPr>
-          <p:spPr>
-            <a:xfrm>
-              <a:off x="282488" y="325677"/>
-              <a:ext cx="2104373" cy="726510"/>
-            </a:xfrm>
-            <a:prstGeom prst="rect">
-              <a:avLst/>
-            </a:prstGeom>
-          </p:spPr>
-          <p:style>
-            <a:lnRef idx="2">
-              <a:schemeClr val="accent1">
-                <a:shade val="50000"/>
-              </a:schemeClr>
-            </a:lnRef>
-            <a:fillRef idx="1">
-              <a:schemeClr val="accent1"/>
-            </a:fillRef>
-            <a:effectRef idx="0">
-              <a:schemeClr val="accent1"/>
-            </a:effectRef>
-            <a:fontRef idx="minor">
-              <a:schemeClr val="lt1"/>
-            </a:fontRef>
-          </p:style>
-          <p:txBody>
-            <a:bodyPr rtlCol="0" anchor="ctr"/>
-            <a:lstStyle/>
-            <a:p>
-              <a:pPr algn="ctr"/>
-              <a:r>
-                <a:rPr kumimoji="1" lang="en-US" altLang="ja-JP" sz="2000" b="1" dirty="0"/>
-                <a:t>Gazebo</a:t>
-              </a:r>
-              <a:br>
-                <a:rPr kumimoji="1" lang="en-US" altLang="ja-JP" sz="2000" b="1" dirty="0"/>
-              </a:br>
-              <a:r>
-                <a:rPr kumimoji="1" lang="en-US" altLang="ja-JP" sz="1400" b="1" dirty="0"/>
-                <a:t>(w/ ROS API)</a:t>
-              </a:r>
-              <a:endParaRPr kumimoji="1" lang="ja-JP" altLang="en-US" sz="1400" b="1" dirty="0"/>
-            </a:p>
-          </p:txBody>
-        </p:sp>
-        <p:cxnSp>
-          <p:nvCxnSpPr>
-            <p:cNvPr id="9" name="直線コネクタ 8">
-              <a:extLst>
-                <a:ext uri="{FF2B5EF4-FFF2-40B4-BE49-F238E27FC236}">
-                  <a16:creationId xmlns:a16="http://schemas.microsoft.com/office/drawing/2014/main" id="{CD22EE81-A69A-463E-B08B-EC373AE9F496}"/>
-                </a:ext>
-              </a:extLst>
-            </p:cNvPr>
-            <p:cNvCxnSpPr>
-              <a:cxnSpLocks/>
-            </p:cNvCxnSpPr>
-            <p:nvPr/>
-          </p:nvCxnSpPr>
-          <p:spPr>
-            <a:xfrm>
-              <a:off x="1315231" y="1052187"/>
-              <a:ext cx="0" cy="5039959"/>
-            </a:xfrm>
-            <a:prstGeom prst="line">
-              <a:avLst/>
-            </a:prstGeom>
-            <a:ln w="57150"/>
-          </p:spPr>
-          <p:style>
-            <a:lnRef idx="1">
-              <a:schemeClr val="accent1"/>
-            </a:lnRef>
-            <a:fillRef idx="0">
-              <a:schemeClr val="accent1"/>
-            </a:fillRef>
-            <a:effectRef idx="0">
-              <a:schemeClr val="accent1"/>
-            </a:effectRef>
-            <a:fontRef idx="minor">
-              <a:schemeClr val="tx1"/>
-            </a:fontRef>
-          </p:style>
-        </p:cxnSp>
-        <p:sp>
-          <p:nvSpPr>
-            <p:cNvPr id="6" name="正方形/長方形 5">
-              <a:extLst>
-                <a:ext uri="{FF2B5EF4-FFF2-40B4-BE49-F238E27FC236}">
-                  <a16:creationId xmlns:a16="http://schemas.microsoft.com/office/drawing/2014/main" id="{BE093F2A-AA58-4553-A55A-47FD42C9B385}"/>
-                </a:ext>
-              </a:extLst>
-            </p:cNvPr>
-            <p:cNvSpPr/>
-            <p:nvPr/>
-          </p:nvSpPr>
-          <p:spPr>
-            <a:xfrm>
-              <a:off x="3156009" y="325677"/>
-              <a:ext cx="2104373" cy="726510"/>
-            </a:xfrm>
-            <a:prstGeom prst="rect">
-              <a:avLst/>
-            </a:prstGeom>
-            <a:solidFill>
-              <a:schemeClr val="accent6"/>
-            </a:solidFill>
-          </p:spPr>
-          <p:style>
-            <a:lnRef idx="2">
-              <a:schemeClr val="accent1">
-                <a:shade val="50000"/>
-              </a:schemeClr>
-            </a:lnRef>
-            <a:fillRef idx="1">
-              <a:schemeClr val="accent1"/>
-            </a:fillRef>
-            <a:effectRef idx="0">
-              <a:schemeClr val="accent1"/>
-            </a:effectRef>
-            <a:fontRef idx="minor">
-              <a:schemeClr val="lt1"/>
-            </a:fontRef>
-          </p:style>
-          <p:txBody>
-            <a:bodyPr rtlCol="0" anchor="ctr"/>
-            <a:lstStyle/>
-            <a:p>
-              <a:pPr algn="ctr"/>
-              <a:r>
-                <a:rPr lang="en-US" altLang="ja-JP" sz="2000" b="1" dirty="0"/>
-                <a:t>r</a:t>
-              </a:r>
-              <a:r>
-                <a:rPr kumimoji="1" lang="en-US" altLang="ja-JP" sz="2000" b="1" dirty="0"/>
-                <a:t>es</a:t>
-              </a:r>
-              <a:r>
-                <a:rPr lang="en-US" altLang="ja-JP" sz="2000" b="1" dirty="0"/>
-                <a:t>tore_</a:t>
-              </a:r>
-            </a:p>
-            <a:p>
-              <a:pPr algn="ctr"/>
-              <a:r>
-                <a:rPr kumimoji="1" lang="en-US" altLang="ja-JP" sz="2000" b="1" dirty="0"/>
-                <a:t>snapshot</a:t>
-              </a:r>
-              <a:endParaRPr kumimoji="1" lang="ja-JP" altLang="en-US" sz="2000" b="1" dirty="0"/>
-            </a:p>
-          </p:txBody>
-        </p:sp>
-        <p:cxnSp>
-          <p:nvCxnSpPr>
-            <p:cNvPr id="10" name="直線コネクタ 9">
-              <a:extLst>
-                <a:ext uri="{FF2B5EF4-FFF2-40B4-BE49-F238E27FC236}">
-                  <a16:creationId xmlns:a16="http://schemas.microsoft.com/office/drawing/2014/main" id="{73044B4D-C379-4276-98CE-1D7FAB3E0AAA}"/>
-                </a:ext>
-              </a:extLst>
-            </p:cNvPr>
-            <p:cNvCxnSpPr>
-              <a:cxnSpLocks/>
-            </p:cNvCxnSpPr>
-            <p:nvPr/>
-          </p:nvCxnSpPr>
-          <p:spPr>
-            <a:xfrm>
-              <a:off x="4201121" y="1052187"/>
-              <a:ext cx="0" cy="5039959"/>
-            </a:xfrm>
-            <a:prstGeom prst="line">
-              <a:avLst/>
-            </a:prstGeom>
-            <a:ln w="57150">
-              <a:solidFill>
-                <a:schemeClr val="accent6"/>
-              </a:solidFill>
-            </a:ln>
-          </p:spPr>
-          <p:style>
-            <a:lnRef idx="1">
-              <a:schemeClr val="accent1"/>
-            </a:lnRef>
-            <a:fillRef idx="0">
-              <a:schemeClr val="accent1"/>
-            </a:fillRef>
-            <a:effectRef idx="0">
-              <a:schemeClr val="accent1"/>
-            </a:effectRef>
-            <a:fontRef idx="minor">
-              <a:schemeClr val="tx1"/>
-            </a:fontRef>
-          </p:style>
-        </p:cxnSp>
         <p:sp>
           <p:nvSpPr>
             <p:cNvPr id="13" name="正方形/長方形 12">
@@ -16615,14 +16287,19 @@
           <p:spPr>
             <a:xfrm>
               <a:off x="3837521" y="1778696"/>
-              <a:ext cx="727200" cy="4154348"/>
+              <a:ext cx="727200" cy="3634307"/>
             </a:xfrm>
             <a:prstGeom prst="rect">
               <a:avLst/>
             </a:prstGeom>
             <a:solidFill>
-              <a:schemeClr val="accent6"/>
+              <a:srgbClr val="0366D6"/>
             </a:solidFill>
+            <a:ln>
+              <a:solidFill>
+                <a:srgbClr val="2F363D"/>
+              </a:solidFill>
+            </a:ln>
           </p:spPr>
           <p:style>
             <a:lnRef idx="2">
@@ -16649,12 +16326,293 @@
             </a:p>
           </p:txBody>
         </p:sp>
+      </p:grpSp>
+      <p:grpSp>
+        <p:nvGrpSpPr>
+          <p:cNvPr id="37" name="グループ化 36">
+            <a:extLst>
+              <a:ext uri="{FF2B5EF4-FFF2-40B4-BE49-F238E27FC236}">
+                <a16:creationId xmlns:a16="http://schemas.microsoft.com/office/drawing/2014/main" id="{06A1D69E-CF8C-4731-809A-7EEFAFC7BF1A}"/>
+              </a:ext>
+            </a:extLst>
+          </p:cNvPr>
+          <p:cNvGrpSpPr/>
+          <p:nvPr/>
+        </p:nvGrpSpPr>
+        <p:grpSpPr>
+          <a:xfrm>
+            <a:off x="6371965" y="283872"/>
+            <a:ext cx="4977894" cy="6290256"/>
+            <a:chOff x="282488" y="325677"/>
+            <a:chExt cx="4977894" cy="6290256"/>
+          </a:xfrm>
+        </p:grpSpPr>
+        <p:sp>
+          <p:nvSpPr>
+            <p:cNvPr id="39" name="正方形/長方形 38">
+              <a:extLst>
+                <a:ext uri="{FF2B5EF4-FFF2-40B4-BE49-F238E27FC236}">
+                  <a16:creationId xmlns:a16="http://schemas.microsoft.com/office/drawing/2014/main" id="{97D335DF-7F38-4643-924B-2BD8E366555A}"/>
+                </a:ext>
+              </a:extLst>
+            </p:cNvPr>
+            <p:cNvSpPr/>
+            <p:nvPr/>
+          </p:nvSpPr>
+          <p:spPr>
+            <a:xfrm>
+              <a:off x="282488" y="325677"/>
+              <a:ext cx="2104373" cy="726510"/>
+            </a:xfrm>
+            <a:prstGeom prst="rect">
+              <a:avLst/>
+            </a:prstGeom>
+            <a:solidFill>
+              <a:srgbClr val="6A737D"/>
+            </a:solidFill>
+            <a:ln>
+              <a:solidFill>
+                <a:srgbClr val="22272E"/>
+              </a:solidFill>
+            </a:ln>
+          </p:spPr>
+          <p:style>
+            <a:lnRef idx="2">
+              <a:schemeClr val="accent1">
+                <a:shade val="50000"/>
+              </a:schemeClr>
+            </a:lnRef>
+            <a:fillRef idx="1">
+              <a:schemeClr val="accent1"/>
+            </a:fillRef>
+            <a:effectRef idx="0">
+              <a:schemeClr val="accent1"/>
+            </a:effectRef>
+            <a:fontRef idx="minor">
+              <a:schemeClr val="lt1"/>
+            </a:fontRef>
+          </p:style>
+          <p:txBody>
+            <a:bodyPr rtlCol="0" anchor="ctr"/>
+            <a:lstStyle/>
+            <a:p>
+              <a:pPr algn="ctr"/>
+              <a:r>
+                <a:rPr kumimoji="1" lang="en-US" altLang="ja-JP" sz="2000" b="1" dirty="0">
+                  <a:solidFill>
+                    <a:srgbClr val="F6F8FA"/>
+                  </a:solidFill>
+                </a:rPr>
+                <a:t>Gazebo</a:t>
+              </a:r>
+              <a:br>
+                <a:rPr kumimoji="1" lang="en-US" altLang="ja-JP" sz="2000" b="1" dirty="0">
+                  <a:solidFill>
+                    <a:srgbClr val="F6F8FA"/>
+                  </a:solidFill>
+                </a:rPr>
+              </a:br>
+              <a:r>
+                <a:rPr kumimoji="1" lang="en-US" altLang="ja-JP" sz="1400" b="1" dirty="0">
+                  <a:solidFill>
+                    <a:srgbClr val="F6F8FA"/>
+                  </a:solidFill>
+                </a:rPr>
+                <a:t>(w/ ROS API)</a:t>
+              </a:r>
+              <a:endParaRPr kumimoji="1" lang="ja-JP" altLang="en-US" sz="1400" b="1" dirty="0">
+                <a:solidFill>
+                  <a:srgbClr val="F6F8FA"/>
+                </a:solidFill>
+              </a:endParaRPr>
+            </a:p>
+          </p:txBody>
+        </p:sp>
+        <p:cxnSp>
+          <p:nvCxnSpPr>
+            <p:cNvPr id="43" name="直線コネクタ 42">
+              <a:extLst>
+                <a:ext uri="{FF2B5EF4-FFF2-40B4-BE49-F238E27FC236}">
+                  <a16:creationId xmlns:a16="http://schemas.microsoft.com/office/drawing/2014/main" id="{31056F61-F423-497C-9E93-279249BD929D}"/>
+                </a:ext>
+              </a:extLst>
+            </p:cNvPr>
+            <p:cNvCxnSpPr>
+              <a:cxnSpLocks/>
+            </p:cNvCxnSpPr>
+            <p:nvPr/>
+          </p:nvCxnSpPr>
+          <p:spPr>
+            <a:xfrm>
+              <a:off x="1315231" y="1052187"/>
+              <a:ext cx="0" cy="5039959"/>
+            </a:xfrm>
+            <a:prstGeom prst="line">
+              <a:avLst/>
+            </a:prstGeom>
+            <a:ln w="57150">
+              <a:solidFill>
+                <a:srgbClr val="6A737D"/>
+              </a:solidFill>
+            </a:ln>
+          </p:spPr>
+          <p:style>
+            <a:lnRef idx="1">
+              <a:schemeClr val="accent1"/>
+            </a:lnRef>
+            <a:fillRef idx="0">
+              <a:schemeClr val="accent1"/>
+            </a:fillRef>
+            <a:effectRef idx="0">
+              <a:schemeClr val="accent1"/>
+            </a:effectRef>
+            <a:fontRef idx="minor">
+              <a:schemeClr val="tx1"/>
+            </a:fontRef>
+          </p:style>
+        </p:cxnSp>
+        <p:sp>
+          <p:nvSpPr>
+            <p:cNvPr id="44" name="正方形/長方形 43">
+              <a:extLst>
+                <a:ext uri="{FF2B5EF4-FFF2-40B4-BE49-F238E27FC236}">
+                  <a16:creationId xmlns:a16="http://schemas.microsoft.com/office/drawing/2014/main" id="{8511C746-49D3-4EA3-B6F0-3B673EDC904E}"/>
+                </a:ext>
+              </a:extLst>
+            </p:cNvPr>
+            <p:cNvSpPr/>
+            <p:nvPr/>
+          </p:nvSpPr>
+          <p:spPr>
+            <a:xfrm>
+              <a:off x="3156009" y="325677"/>
+              <a:ext cx="2104373" cy="726510"/>
+            </a:xfrm>
+            <a:prstGeom prst="rect">
+              <a:avLst/>
+            </a:prstGeom>
+            <a:solidFill>
+              <a:srgbClr val="28A745"/>
+            </a:solidFill>
+            <a:ln>
+              <a:solidFill>
+                <a:srgbClr val="22272E"/>
+              </a:solidFill>
+            </a:ln>
+          </p:spPr>
+          <p:style>
+            <a:lnRef idx="2">
+              <a:schemeClr val="accent1">
+                <a:shade val="50000"/>
+              </a:schemeClr>
+            </a:lnRef>
+            <a:fillRef idx="1">
+              <a:schemeClr val="accent1"/>
+            </a:fillRef>
+            <a:effectRef idx="0">
+              <a:schemeClr val="accent1"/>
+            </a:effectRef>
+            <a:fontRef idx="minor">
+              <a:schemeClr val="lt1"/>
+            </a:fontRef>
+          </p:style>
+          <p:txBody>
+            <a:bodyPr rtlCol="0" anchor="ctr"/>
+            <a:lstStyle/>
+            <a:p>
+              <a:pPr algn="ctr"/>
+              <a:r>
+                <a:rPr lang="en-US" altLang="ja-JP" sz="2000" b="1" dirty="0">
+                  <a:solidFill>
+                    <a:srgbClr val="F6F8FA"/>
+                  </a:solidFill>
+                </a:rPr>
+                <a:t>r</a:t>
+              </a:r>
+              <a:r>
+                <a:rPr kumimoji="1" lang="en-US" altLang="ja-JP" sz="2000" b="1" dirty="0">
+                  <a:solidFill>
+                    <a:srgbClr val="F6F8FA"/>
+                  </a:solidFill>
+                </a:rPr>
+                <a:t>es</a:t>
+              </a:r>
+              <a:r>
+                <a:rPr lang="en-US" altLang="ja-JP" sz="2000" b="1" dirty="0">
+                  <a:solidFill>
+                    <a:srgbClr val="F6F8FA"/>
+                  </a:solidFill>
+                </a:rPr>
+                <a:t>tore_</a:t>
+              </a:r>
+            </a:p>
+            <a:p>
+              <a:pPr algn="ctr"/>
+              <a:r>
+                <a:rPr kumimoji="1" lang="en-US" altLang="ja-JP" sz="2000" b="1" dirty="0">
+                  <a:solidFill>
+                    <a:srgbClr val="F6F8FA"/>
+                  </a:solidFill>
+                </a:rPr>
+                <a:t>snapshot</a:t>
+              </a:r>
+              <a:endParaRPr kumimoji="1" lang="ja-JP" altLang="en-US" sz="2000" b="1" dirty="0">
+                <a:solidFill>
+                  <a:srgbClr val="F6F8FA"/>
+                </a:solidFill>
+              </a:endParaRPr>
+            </a:p>
+          </p:txBody>
+        </p:sp>
+        <p:cxnSp>
+          <p:nvCxnSpPr>
+            <p:cNvPr id="53" name="直線コネクタ 52">
+              <a:extLst>
+                <a:ext uri="{FF2B5EF4-FFF2-40B4-BE49-F238E27FC236}">
+                  <a16:creationId xmlns:a16="http://schemas.microsoft.com/office/drawing/2014/main" id="{D103CB47-E946-49F6-B0C4-B5EDA115BFA9}"/>
+                </a:ext>
+              </a:extLst>
+            </p:cNvPr>
+            <p:cNvCxnSpPr>
+              <a:cxnSpLocks/>
+            </p:cNvCxnSpPr>
+            <p:nvPr/>
+          </p:nvCxnSpPr>
+          <p:spPr>
+            <a:xfrm>
+              <a:off x="4201121" y="1052187"/>
+              <a:ext cx="0" cy="5039959"/>
+            </a:xfrm>
+            <a:prstGeom prst="line">
+              <a:avLst/>
+            </a:prstGeom>
+            <a:ln w="57150">
+              <a:solidFill>
+                <a:srgbClr val="28A745"/>
+              </a:solidFill>
+            </a:ln>
+          </p:spPr>
+          <p:style>
+            <a:lnRef idx="1">
+              <a:schemeClr val="accent1"/>
+            </a:lnRef>
+            <a:fillRef idx="0">
+              <a:schemeClr val="accent1"/>
+            </a:fillRef>
+            <a:effectRef idx="0">
+              <a:schemeClr val="accent1"/>
+            </a:effectRef>
+            <a:fontRef idx="minor">
+              <a:schemeClr val="tx1"/>
+            </a:fontRef>
+          </p:style>
+        </p:cxnSp>
         <p:grpSp>
           <p:nvGrpSpPr>
-            <p:cNvPr id="3" name="グループ化 2">
+            <p:cNvPr id="54" name="グループ化 53">
               <a:extLst>
                 <a:ext uri="{FF2B5EF4-FFF2-40B4-BE49-F238E27FC236}">
-                  <a16:creationId xmlns:a16="http://schemas.microsoft.com/office/drawing/2014/main" id="{42E36FE7-29C9-4798-966D-FC331FC07347}"/>
+                  <a16:creationId xmlns:a16="http://schemas.microsoft.com/office/drawing/2014/main" id="{929B8AE7-2AB0-4001-8B8B-90C5C8CC8714}"/>
                 </a:ext>
               </a:extLst>
             </p:cNvPr>
@@ -16671,10 +16629,10 @@
           </p:grpSpPr>
           <p:cxnSp>
             <p:nvCxnSpPr>
-              <p:cNvPr id="35" name="直線コネクタ 34">
+              <p:cNvPr id="83" name="直線コネクタ 82">
                 <a:extLst>
                   <a:ext uri="{FF2B5EF4-FFF2-40B4-BE49-F238E27FC236}">
-                    <a16:creationId xmlns:a16="http://schemas.microsoft.com/office/drawing/2014/main" id="{44C7AEC1-D1B9-439D-9890-D96E73165A5B}"/>
+                    <a16:creationId xmlns:a16="http://schemas.microsoft.com/office/drawing/2014/main" id="{9BFE3CA6-14C5-44D2-B14E-3D9F67FB9E86}"/>
                   </a:ext>
                 </a:extLst>
               </p:cNvPr>
@@ -16693,7 +16651,7 @@
               </a:prstGeom>
               <a:ln w="57150">
                 <a:solidFill>
-                  <a:schemeClr val="accent6"/>
+                  <a:srgbClr val="28A745"/>
                 </a:solidFill>
                 <a:headEnd type="none" w="med" len="med"/>
                 <a:tailEnd type="triangle" w="med" len="med"/>
@@ -16716,10 +16674,10 @@
           </p:cxnSp>
           <p:sp>
             <p:nvSpPr>
-              <p:cNvPr id="45" name="テキスト ボックス 44">
+              <p:cNvPr id="84" name="テキスト ボックス 83">
                 <a:extLst>
                   <a:ext uri="{FF2B5EF4-FFF2-40B4-BE49-F238E27FC236}">
-                    <a16:creationId xmlns:a16="http://schemas.microsoft.com/office/drawing/2014/main" id="{6AAEEC18-BEA6-47A8-A900-0B2510C77DEB}"/>
+                    <a16:creationId xmlns:a16="http://schemas.microsoft.com/office/drawing/2014/main" id="{574B6DA9-9DFE-4D93-AC0A-80508B5F9C38}"/>
                   </a:ext>
                 </a:extLst>
               </p:cNvPr>
@@ -16745,13 +16703,10 @@
                 <a:pPr algn="ctr"/>
                 <a:r>
                   <a:rPr kumimoji="1" lang="en-US" altLang="ja-JP" sz="1400" dirty="0">
-                    <a:effectLst>
-                      <a:glow rad="101600">
-                        <a:schemeClr val="bg1">
-                          <a:alpha val="80000"/>
-                        </a:schemeClr>
-                      </a:glow>
-                    </a:effectLst>
+                    <a:solidFill>
+                      <a:srgbClr val="6A737D"/>
+                    </a:solidFill>
+                    <a:effectLst/>
                     <a:latin typeface="Times New Roman" panose="02020603050405020304" pitchFamily="18" charset="0"/>
                     <a:cs typeface="Times New Roman" panose="02020603050405020304" pitchFamily="18" charset="0"/>
                   </a:rPr>
@@ -16759,13 +16714,10 @@
                 </a:r>
                 <a:r>
                   <a:rPr kumimoji="1" lang="en-US" altLang="ja-JP" sz="1400" dirty="0" err="1">
-                    <a:effectLst>
-                      <a:glow rad="101600">
-                        <a:schemeClr val="bg1">
-                          <a:alpha val="80000"/>
-                        </a:schemeClr>
-                      </a:glow>
-                    </a:effectLst>
+                    <a:solidFill>
+                      <a:srgbClr val="6A737D"/>
+                    </a:solidFill>
+                    <a:effectLst/>
                     <a:latin typeface="Times New Roman" panose="02020603050405020304" pitchFamily="18" charset="0"/>
                     <a:cs typeface="Times New Roman" panose="02020603050405020304" pitchFamily="18" charset="0"/>
                   </a:rPr>
@@ -16773,26 +16725,20 @@
                 </a:r>
                 <a:br>
                   <a:rPr kumimoji="1" lang="en-US" altLang="ja-JP" sz="1400" dirty="0">
-                    <a:effectLst>
-                      <a:glow rad="101600">
-                        <a:schemeClr val="bg1">
-                          <a:alpha val="80000"/>
-                        </a:schemeClr>
-                      </a:glow>
-                    </a:effectLst>
+                    <a:solidFill>
+                      <a:srgbClr val="6A737D"/>
+                    </a:solidFill>
+                    <a:effectLst/>
                     <a:latin typeface="Times New Roman" panose="02020603050405020304" pitchFamily="18" charset="0"/>
                     <a:cs typeface="Times New Roman" panose="02020603050405020304" pitchFamily="18" charset="0"/>
                   </a:rPr>
                 </a:br>
                 <a:r>
                   <a:rPr kumimoji="1" lang="en-US" altLang="ja-JP" sz="1400" dirty="0">
-                    <a:effectLst>
-                      <a:glow rad="101600">
-                        <a:schemeClr val="bg1">
-                          <a:alpha val="80000"/>
-                        </a:schemeClr>
-                      </a:glow>
-                    </a:effectLst>
+                    <a:solidFill>
+                      <a:srgbClr val="6A737D"/>
+                    </a:solidFill>
+                    <a:effectLst/>
                     <a:latin typeface="Times New Roman" panose="02020603050405020304" pitchFamily="18" charset="0"/>
                     <a:cs typeface="Times New Roman" panose="02020603050405020304" pitchFamily="18" charset="0"/>
                   </a:rPr>
@@ -16800,13 +16746,10 @@
                 </a:r>
                 <a:r>
                   <a:rPr lang="en-US" altLang="ja-JP" sz="1400" dirty="0">
-                    <a:effectLst>
-                      <a:glow rad="101600">
-                        <a:schemeClr val="bg1">
-                          <a:alpha val="80000"/>
-                        </a:schemeClr>
-                      </a:glow>
-                    </a:effectLst>
+                    <a:solidFill>
+                      <a:srgbClr val="6A737D"/>
+                    </a:solidFill>
+                    <a:effectLst/>
                     <a:latin typeface="Times New Roman" panose="02020603050405020304" pitchFamily="18" charset="0"/>
                     <a:cs typeface="Times New Roman" panose="02020603050405020304" pitchFamily="18" charset="0"/>
                   </a:rPr>
@@ -16814,13 +16757,10 @@
                 </a:r>
                 <a:r>
                   <a:rPr lang="ja-JP" altLang="en-US" sz="1400" dirty="0">
-                    <a:effectLst>
-                      <a:glow rad="101600">
-                        <a:schemeClr val="bg1">
-                          <a:alpha val="80000"/>
-                        </a:schemeClr>
-                      </a:glow>
-                    </a:effectLst>
+                    <a:solidFill>
+                      <a:srgbClr val="6A737D"/>
+                    </a:solidFill>
+                    <a:effectLst/>
                     <a:latin typeface="Times New Roman" panose="02020603050405020304" pitchFamily="18" charset="0"/>
                     <a:cs typeface="Times New Roman" panose="02020603050405020304" pitchFamily="18" charset="0"/>
                   </a:rPr>
@@ -16828,13 +16768,10 @@
                 </a:r>
                 <a:r>
                   <a:rPr lang="en-US" altLang="ja-JP" sz="1400" dirty="0">
-                    <a:effectLst>
-                      <a:glow rad="101600">
-                        <a:schemeClr val="bg1">
-                          <a:alpha val="80000"/>
-                        </a:schemeClr>
-                      </a:glow>
-                    </a:effectLst>
+                    <a:solidFill>
+                      <a:srgbClr val="6A737D"/>
+                    </a:solidFill>
+                    <a:effectLst/>
                     <a:latin typeface="Times New Roman" panose="02020603050405020304" pitchFamily="18" charset="0"/>
                     <a:cs typeface="Times New Roman" panose="02020603050405020304" pitchFamily="18" charset="0"/>
                   </a:rPr>
@@ -16842,13 +16779,10 @@
                 </a:r>
                 <a:r>
                   <a:rPr lang="ja-JP" altLang="en-US" sz="1400" dirty="0">
-                    <a:effectLst>
-                      <a:glow rad="101600">
-                        <a:schemeClr val="bg1">
-                          <a:alpha val="80000"/>
-                        </a:schemeClr>
-                      </a:glow>
-                    </a:effectLst>
+                    <a:solidFill>
+                      <a:srgbClr val="6A737D"/>
+                    </a:solidFill>
+                    <a:effectLst/>
                     <a:latin typeface="Times New Roman" panose="02020603050405020304" pitchFamily="18" charset="0"/>
                     <a:cs typeface="Times New Roman" panose="02020603050405020304" pitchFamily="18" charset="0"/>
                   </a:rPr>
@@ -16856,13 +16790,10 @@
                 </a:r>
                 <a:r>
                   <a:rPr lang="en-US" altLang="ja-JP" sz="1400" dirty="0">
-                    <a:effectLst>
-                      <a:glow rad="101600">
-                        <a:schemeClr val="bg1">
-                          <a:alpha val="80000"/>
-                        </a:schemeClr>
-                      </a:glow>
-                    </a:effectLst>
+                    <a:solidFill>
+                      <a:srgbClr val="6A737D"/>
+                    </a:solidFill>
+                    <a:effectLst/>
                     <a:latin typeface="Times New Roman" panose="02020603050405020304" pitchFamily="18" charset="0"/>
                     <a:cs typeface="Times New Roman" panose="02020603050405020304" pitchFamily="18" charset="0"/>
                   </a:rPr>
@@ -16870,26 +16801,20 @@
                 </a:r>
                 <a:r>
                   <a:rPr kumimoji="1" lang="en-US" altLang="ja-JP" sz="1400" dirty="0">
-                    <a:effectLst>
-                      <a:glow rad="101600">
-                        <a:schemeClr val="bg1">
-                          <a:alpha val="80000"/>
-                        </a:schemeClr>
-                      </a:glow>
-                    </a:effectLst>
+                    <a:solidFill>
+                      <a:srgbClr val="6A737D"/>
+                    </a:solidFill>
+                    <a:effectLst/>
                     <a:latin typeface="Times New Roman" panose="02020603050405020304" pitchFamily="18" charset="0"/>
                     <a:cs typeface="Times New Roman" panose="02020603050405020304" pitchFamily="18" charset="0"/>
                   </a:rPr>
                   <a:t>)</a:t>
                 </a:r>
                 <a:endParaRPr kumimoji="1" lang="ja-JP" altLang="en-US" sz="1400" dirty="0">
-                  <a:effectLst>
-                    <a:glow rad="101600">
-                      <a:schemeClr val="bg1">
-                        <a:alpha val="80000"/>
-                      </a:schemeClr>
-                    </a:glow>
-                  </a:effectLst>
+                  <a:solidFill>
+                    <a:srgbClr val="6A737D"/>
+                  </a:solidFill>
+                  <a:effectLst/>
                   <a:latin typeface="Times New Roman" panose="02020603050405020304" pitchFamily="18" charset="0"/>
                   <a:cs typeface="Times New Roman" panose="02020603050405020304" pitchFamily="18" charset="0"/>
                 </a:endParaRPr>
@@ -16898,10 +16823,10 @@
           </p:sp>
           <p:cxnSp>
             <p:nvCxnSpPr>
-              <p:cNvPr id="36" name="直線コネクタ 35">
+              <p:cNvPr id="85" name="直線コネクタ 84">
                 <a:extLst>
                   <a:ext uri="{FF2B5EF4-FFF2-40B4-BE49-F238E27FC236}">
-                    <a16:creationId xmlns:a16="http://schemas.microsoft.com/office/drawing/2014/main" id="{3D69D628-13FD-4E86-9CE4-43008C216AC1}"/>
+                    <a16:creationId xmlns:a16="http://schemas.microsoft.com/office/drawing/2014/main" id="{73744ACB-D736-461B-BBDB-EFB678327B1E}"/>
                   </a:ext>
                 </a:extLst>
               </p:cNvPr>
@@ -16917,6 +16842,9 @@
                 <a:avLst/>
               </a:prstGeom>
               <a:ln w="57150">
+                <a:solidFill>
+                  <a:srgbClr val="6A737D"/>
+                </a:solidFill>
                 <a:prstDash val="sysDash"/>
                 <a:headEnd type="none" w="med" len="med"/>
                 <a:tailEnd type="triangle" w="med" len="med"/>
@@ -16939,10 +16867,10 @@
           </p:cxnSp>
           <p:sp>
             <p:nvSpPr>
-              <p:cNvPr id="12" name="正方形/長方形 11">
+              <p:cNvPr id="86" name="正方形/長方形 85">
                 <a:extLst>
                   <a:ext uri="{FF2B5EF4-FFF2-40B4-BE49-F238E27FC236}">
-                    <a16:creationId xmlns:a16="http://schemas.microsoft.com/office/drawing/2014/main" id="{FAFAC947-5C7F-4F27-8F4F-398373C6743F}"/>
+                    <a16:creationId xmlns:a16="http://schemas.microsoft.com/office/drawing/2014/main" id="{3A74AC15-D426-41DC-BB27-2BBA0B9685E7}"/>
                   </a:ext>
                 </a:extLst>
               </p:cNvPr>
@@ -16957,6 +16885,14 @@
               <a:prstGeom prst="rect">
                 <a:avLst/>
               </a:prstGeom>
+              <a:solidFill>
+                <a:srgbClr val="6A737D"/>
+              </a:solidFill>
+              <a:ln>
+                <a:solidFill>
+                  <a:srgbClr val="22272E"/>
+                </a:solidFill>
+              </a:ln>
             </p:spPr>
             <p:style>
               <a:lnRef idx="2">
@@ -16986,10 +16922,10 @@
         </p:grpSp>
         <p:grpSp>
           <p:nvGrpSpPr>
-            <p:cNvPr id="5" name="グループ化 4">
+            <p:cNvPr id="55" name="グループ化 54">
               <a:extLst>
                 <a:ext uri="{FF2B5EF4-FFF2-40B4-BE49-F238E27FC236}">
-                  <a16:creationId xmlns:a16="http://schemas.microsoft.com/office/drawing/2014/main" id="{0EFE408B-26C6-49E7-BE38-C0E4AD2FB657}"/>
+                  <a16:creationId xmlns:a16="http://schemas.microsoft.com/office/drawing/2014/main" id="{7015CFE9-9B5B-42E8-AE26-C0DCB62531F6}"/>
                 </a:ext>
               </a:extLst>
             </p:cNvPr>
@@ -17006,10 +16942,10 @@
           </p:grpSpPr>
           <p:cxnSp>
             <p:nvCxnSpPr>
-              <p:cNvPr id="38" name="直線コネクタ 37">
+              <p:cNvPr id="79" name="直線コネクタ 78">
                 <a:extLst>
                   <a:ext uri="{FF2B5EF4-FFF2-40B4-BE49-F238E27FC236}">
-                    <a16:creationId xmlns:a16="http://schemas.microsoft.com/office/drawing/2014/main" id="{633EF232-658F-4B1F-AC2C-566A9D014225}"/>
+                    <a16:creationId xmlns:a16="http://schemas.microsoft.com/office/drawing/2014/main" id="{7B93E4EC-276B-421C-AE92-F44AE5043972}"/>
                   </a:ext>
                 </a:extLst>
               </p:cNvPr>
@@ -17028,7 +16964,7 @@
               </a:prstGeom>
               <a:ln w="57150">
                 <a:solidFill>
-                  <a:schemeClr val="accent6"/>
+                  <a:srgbClr val="28A745"/>
                 </a:solidFill>
                 <a:headEnd type="none" w="med" len="med"/>
                 <a:tailEnd type="triangle" w="med" len="med"/>
@@ -17051,10 +16987,10 @@
           </p:cxnSp>
           <p:sp>
             <p:nvSpPr>
-              <p:cNvPr id="46" name="テキスト ボックス 45">
+              <p:cNvPr id="80" name="テキスト ボックス 79">
                 <a:extLst>
                   <a:ext uri="{FF2B5EF4-FFF2-40B4-BE49-F238E27FC236}">
-                    <a16:creationId xmlns:a16="http://schemas.microsoft.com/office/drawing/2014/main" id="{FC1A5177-B8B0-4FA6-BE47-0B9ABC3DDFC6}"/>
+                    <a16:creationId xmlns:a16="http://schemas.microsoft.com/office/drawing/2014/main" id="{8876B115-EB43-4C82-B8A8-F263BC4D98F8}"/>
                   </a:ext>
                 </a:extLst>
               </p:cNvPr>
@@ -17080,13 +17016,10 @@
                 <a:pPr algn="ctr"/>
                 <a:r>
                   <a:rPr kumimoji="1" lang="en-US" altLang="ja-JP" sz="1400" dirty="0">
-                    <a:effectLst>
-                      <a:glow rad="101600">
-                        <a:schemeClr val="bg1">
-                          <a:alpha val="80000"/>
-                        </a:schemeClr>
-                      </a:glow>
-                    </a:effectLst>
+                    <a:solidFill>
+                      <a:srgbClr val="6A737D"/>
+                    </a:solidFill>
+                    <a:effectLst/>
                     <a:latin typeface="Times New Roman" panose="02020603050405020304" pitchFamily="18" charset="0"/>
                     <a:cs typeface="Times New Roman" panose="02020603050405020304" pitchFamily="18" charset="0"/>
                   </a:rPr>
@@ -17094,13 +17027,10 @@
                 </a:r>
                 <a:r>
                   <a:rPr lang="en-US" altLang="ja-JP" sz="1400" dirty="0" err="1">
-                    <a:effectLst>
-                      <a:glow rad="101600">
-                        <a:schemeClr val="bg1">
-                          <a:alpha val="80000"/>
-                        </a:schemeClr>
-                      </a:glow>
-                    </a:effectLst>
+                    <a:solidFill>
+                      <a:srgbClr val="6A737D"/>
+                    </a:solidFill>
+                    <a:effectLst/>
                     <a:latin typeface="Times New Roman" panose="02020603050405020304" pitchFamily="18" charset="0"/>
                     <a:cs typeface="Times New Roman" panose="02020603050405020304" pitchFamily="18" charset="0"/>
                   </a:rPr>
@@ -17108,13 +17038,10 @@
                 </a:r>
                 <a:r>
                   <a:rPr kumimoji="1" lang="en-US" altLang="ja-JP" sz="1400" dirty="0" err="1">
-                    <a:effectLst>
-                      <a:glow rad="101600">
-                        <a:schemeClr val="bg1">
-                          <a:alpha val="80000"/>
-                        </a:schemeClr>
-                      </a:glow>
-                    </a:effectLst>
+                    <a:solidFill>
+                      <a:srgbClr val="6A737D"/>
+                    </a:solidFill>
+                    <a:effectLst/>
                     <a:latin typeface="Times New Roman" panose="02020603050405020304" pitchFamily="18" charset="0"/>
                     <a:cs typeface="Times New Roman" panose="02020603050405020304" pitchFamily="18" charset="0"/>
                   </a:rPr>
@@ -17122,26 +17049,20 @@
                 </a:r>
                 <a:r>
                   <a:rPr lang="en-US" altLang="ja-JP" sz="1400" baseline="30000" dirty="0">
-                    <a:effectLst>
-                      <a:glow rad="101600">
-                        <a:schemeClr val="bg1">
-                          <a:alpha val="80000"/>
-                        </a:schemeClr>
-                      </a:glow>
-                    </a:effectLst>
+                    <a:solidFill>
+                      <a:srgbClr val="6A737D"/>
+                    </a:solidFill>
+                    <a:effectLst/>
                     <a:latin typeface="Times New Roman" panose="02020603050405020304" pitchFamily="18" charset="0"/>
                     <a:cs typeface="Times New Roman" panose="02020603050405020304" pitchFamily="18" charset="0"/>
                   </a:rPr>
                   <a:t>*</a:t>
                 </a:r>
                 <a:endParaRPr kumimoji="1" lang="ja-JP" altLang="en-US" sz="1400" baseline="30000" dirty="0">
-                  <a:effectLst>
-                    <a:glow rad="101600">
-                      <a:schemeClr val="bg1">
-                        <a:alpha val="80000"/>
-                      </a:schemeClr>
-                    </a:glow>
-                  </a:effectLst>
+                  <a:solidFill>
+                    <a:srgbClr val="6A737D"/>
+                  </a:solidFill>
+                  <a:effectLst/>
                   <a:latin typeface="Times New Roman" panose="02020603050405020304" pitchFamily="18" charset="0"/>
                   <a:cs typeface="Times New Roman" panose="02020603050405020304" pitchFamily="18" charset="0"/>
                 </a:endParaRPr>
@@ -17150,10 +17071,10 @@
           </p:sp>
           <p:cxnSp>
             <p:nvCxnSpPr>
-              <p:cNvPr id="47" name="直線コネクタ 46">
+              <p:cNvPr id="81" name="直線コネクタ 80">
                 <a:extLst>
                   <a:ext uri="{FF2B5EF4-FFF2-40B4-BE49-F238E27FC236}">
-                    <a16:creationId xmlns:a16="http://schemas.microsoft.com/office/drawing/2014/main" id="{7E82140D-BFC2-46A7-882C-A5045D8544B0}"/>
+                    <a16:creationId xmlns:a16="http://schemas.microsoft.com/office/drawing/2014/main" id="{5F68EE5D-6DCD-4C27-860D-11C530A987AF}"/>
                   </a:ext>
                 </a:extLst>
               </p:cNvPr>
@@ -17169,6 +17090,9 @@
                 <a:avLst/>
               </a:prstGeom>
               <a:ln w="57150">
+                <a:solidFill>
+                  <a:srgbClr val="6A737D"/>
+                </a:solidFill>
                 <a:prstDash val="sysDash"/>
                 <a:headEnd type="none" w="med" len="med"/>
                 <a:tailEnd type="triangle" w="med" len="med"/>
@@ -17191,10 +17115,10 @@
           </p:cxnSp>
           <p:sp>
             <p:nvSpPr>
-              <p:cNvPr id="48" name="正方形/長方形 47">
+              <p:cNvPr id="82" name="正方形/長方形 81">
                 <a:extLst>
                   <a:ext uri="{FF2B5EF4-FFF2-40B4-BE49-F238E27FC236}">
-                    <a16:creationId xmlns:a16="http://schemas.microsoft.com/office/drawing/2014/main" id="{F855C7CB-BF93-4E2E-8E8B-4CD58906EFAA}"/>
+                    <a16:creationId xmlns:a16="http://schemas.microsoft.com/office/drawing/2014/main" id="{BCB09F67-8218-4943-B557-49575E925265}"/>
                   </a:ext>
                 </a:extLst>
               </p:cNvPr>
@@ -17209,6 +17133,14 @@
               <a:prstGeom prst="rect">
                 <a:avLst/>
               </a:prstGeom>
+              <a:solidFill>
+                <a:srgbClr val="6A737D"/>
+              </a:solidFill>
+              <a:ln>
+                <a:solidFill>
+                  <a:srgbClr val="22272E"/>
+                </a:solidFill>
+              </a:ln>
             </p:spPr>
             <p:style>
               <a:lnRef idx="2">
@@ -17238,10 +17170,10 @@
         </p:grpSp>
         <p:grpSp>
           <p:nvGrpSpPr>
-            <p:cNvPr id="7" name="グループ化 6">
+            <p:cNvPr id="56" name="グループ化 55">
               <a:extLst>
                 <a:ext uri="{FF2B5EF4-FFF2-40B4-BE49-F238E27FC236}">
-                  <a16:creationId xmlns:a16="http://schemas.microsoft.com/office/drawing/2014/main" id="{86E3CEA6-1879-438A-AD1D-C48CF590C727}"/>
+                  <a16:creationId xmlns:a16="http://schemas.microsoft.com/office/drawing/2014/main" id="{05C20C54-153F-42CB-B592-BCFD713DFC13}"/>
                 </a:ext>
               </a:extLst>
             </p:cNvPr>
@@ -17258,10 +17190,10 @@
           </p:grpSpPr>
           <p:cxnSp>
             <p:nvCxnSpPr>
-              <p:cNvPr id="49" name="直線コネクタ 48">
+              <p:cNvPr id="75" name="直線コネクタ 74">
                 <a:extLst>
                   <a:ext uri="{FF2B5EF4-FFF2-40B4-BE49-F238E27FC236}">
-                    <a16:creationId xmlns:a16="http://schemas.microsoft.com/office/drawing/2014/main" id="{3D764752-848F-4ED6-B364-91258D636FB0}"/>
+                    <a16:creationId xmlns:a16="http://schemas.microsoft.com/office/drawing/2014/main" id="{C8C7D5EE-1EA5-4FB9-A1F3-67112A67E3FC}"/>
                   </a:ext>
                 </a:extLst>
               </p:cNvPr>
@@ -17280,7 +17212,7 @@
               </a:prstGeom>
               <a:ln w="57150">
                 <a:solidFill>
-                  <a:schemeClr val="accent6"/>
+                  <a:srgbClr val="28A745"/>
                 </a:solidFill>
                 <a:headEnd type="none" w="med" len="med"/>
                 <a:tailEnd type="triangle" w="med" len="med"/>
@@ -17303,10 +17235,10 @@
           </p:cxnSp>
           <p:sp>
             <p:nvSpPr>
-              <p:cNvPr id="50" name="テキスト ボックス 49">
+              <p:cNvPr id="76" name="テキスト ボックス 75">
                 <a:extLst>
                   <a:ext uri="{FF2B5EF4-FFF2-40B4-BE49-F238E27FC236}">
-                    <a16:creationId xmlns:a16="http://schemas.microsoft.com/office/drawing/2014/main" id="{F0B8D94A-DD4A-496A-BC08-7C32F05F9716}"/>
+                    <a16:creationId xmlns:a16="http://schemas.microsoft.com/office/drawing/2014/main" id="{DFD900C4-175A-440B-92F0-C813A16B4743}"/>
                   </a:ext>
                 </a:extLst>
               </p:cNvPr>
@@ -17332,13 +17264,10 @@
                 <a:pPr algn="ctr"/>
                 <a:r>
                   <a:rPr kumimoji="1" lang="en-US" altLang="ja-JP" sz="1400" dirty="0">
-                    <a:effectLst>
-                      <a:glow rad="101600">
-                        <a:schemeClr val="bg1">
-                          <a:alpha val="80000"/>
-                        </a:schemeClr>
-                      </a:glow>
-                    </a:effectLst>
+                    <a:solidFill>
+                      <a:srgbClr val="6A737D"/>
+                    </a:solidFill>
+                    <a:effectLst/>
                     <a:latin typeface="Times New Roman" panose="02020603050405020304" pitchFamily="18" charset="0"/>
                     <a:cs typeface="Times New Roman" panose="02020603050405020304" pitchFamily="18" charset="0"/>
                   </a:rPr>
@@ -17346,13 +17275,10 @@
                 </a:r>
                 <a:r>
                   <a:rPr kumimoji="1" lang="en-US" altLang="ja-JP" sz="1400" dirty="0" err="1">
-                    <a:effectLst>
-                      <a:glow rad="101600">
-                        <a:schemeClr val="bg1">
-                          <a:alpha val="80000"/>
-                        </a:schemeClr>
-                      </a:glow>
-                    </a:effectLst>
+                    <a:solidFill>
+                      <a:srgbClr val="6A737D"/>
+                    </a:solidFill>
+                    <a:effectLst/>
                     <a:latin typeface="Times New Roman" panose="02020603050405020304" pitchFamily="18" charset="0"/>
                     <a:cs typeface="Times New Roman" panose="02020603050405020304" pitchFamily="18" charset="0"/>
                   </a:rPr>
@@ -17360,13 +17286,10 @@
                 </a:r>
                 <a:r>
                   <a:rPr lang="en-US" altLang="ja-JP" sz="1400" dirty="0" err="1">
-                    <a:effectLst>
-                      <a:glow rad="101600">
-                        <a:schemeClr val="bg1">
-                          <a:alpha val="80000"/>
-                        </a:schemeClr>
-                      </a:glow>
-                    </a:effectLst>
+                    <a:solidFill>
+                      <a:srgbClr val="6A737D"/>
+                    </a:solidFill>
+                    <a:effectLst/>
                     <a:latin typeface="Times New Roman" panose="02020603050405020304" pitchFamily="18" charset="0"/>
                     <a:cs typeface="Times New Roman" panose="02020603050405020304" pitchFamily="18" charset="0"/>
                   </a:rPr>
@@ -17374,13 +17297,10 @@
                 </a:r>
                 <a:r>
                   <a:rPr kumimoji="1" lang="en-US" altLang="ja-JP" sz="1400" dirty="0" err="1">
-                    <a:effectLst>
-                      <a:glow rad="101600">
-                        <a:schemeClr val="bg1">
-                          <a:alpha val="80000"/>
-                        </a:schemeClr>
-                      </a:glow>
-                    </a:effectLst>
+                    <a:solidFill>
+                      <a:srgbClr val="6A737D"/>
+                    </a:solidFill>
+                    <a:effectLst/>
                     <a:latin typeface="Times New Roman" panose="02020603050405020304" pitchFamily="18" charset="0"/>
                     <a:cs typeface="Times New Roman" panose="02020603050405020304" pitchFamily="18" charset="0"/>
                   </a:rPr>
@@ -17388,26 +17308,20 @@
                 </a:r>
                 <a:r>
                   <a:rPr lang="en-US" altLang="ja-JP" sz="1400" baseline="30000" dirty="0">
-                    <a:effectLst>
-                      <a:glow rad="101600">
-                        <a:schemeClr val="bg1">
-                          <a:alpha val="80000"/>
-                        </a:schemeClr>
-                      </a:glow>
-                    </a:effectLst>
+                    <a:solidFill>
+                      <a:srgbClr val="6A737D"/>
+                    </a:solidFill>
+                    <a:effectLst/>
                     <a:latin typeface="Times New Roman" panose="02020603050405020304" pitchFamily="18" charset="0"/>
                     <a:cs typeface="Times New Roman" panose="02020603050405020304" pitchFamily="18" charset="0"/>
                   </a:rPr>
                   <a:t>*</a:t>
                 </a:r>
                 <a:endParaRPr kumimoji="1" lang="ja-JP" altLang="en-US" sz="1400" dirty="0">
-                  <a:effectLst>
-                    <a:glow rad="101600">
-                      <a:schemeClr val="bg1">
-                        <a:alpha val="80000"/>
-                      </a:schemeClr>
-                    </a:glow>
-                  </a:effectLst>
+                  <a:solidFill>
+                    <a:srgbClr val="6A737D"/>
+                  </a:solidFill>
+                  <a:effectLst/>
                   <a:latin typeface="Times New Roman" panose="02020603050405020304" pitchFamily="18" charset="0"/>
                   <a:cs typeface="Times New Roman" panose="02020603050405020304" pitchFamily="18" charset="0"/>
                 </a:endParaRPr>
@@ -17416,10 +17330,10 @@
           </p:sp>
           <p:cxnSp>
             <p:nvCxnSpPr>
-              <p:cNvPr id="51" name="直線コネクタ 50">
+              <p:cNvPr id="77" name="直線コネクタ 76">
                 <a:extLst>
                   <a:ext uri="{FF2B5EF4-FFF2-40B4-BE49-F238E27FC236}">
-                    <a16:creationId xmlns:a16="http://schemas.microsoft.com/office/drawing/2014/main" id="{4AA41EEB-1C94-45CD-8FA9-161990F68AF7}"/>
+                    <a16:creationId xmlns:a16="http://schemas.microsoft.com/office/drawing/2014/main" id="{592D8F9C-E66F-4ACE-8B2C-84FC69783185}"/>
                   </a:ext>
                 </a:extLst>
               </p:cNvPr>
@@ -17435,6 +17349,9 @@
                 <a:avLst/>
               </a:prstGeom>
               <a:ln w="57150">
+                <a:solidFill>
+                  <a:srgbClr val="6A737D"/>
+                </a:solidFill>
                 <a:prstDash val="sysDash"/>
                 <a:headEnd type="none" w="med" len="med"/>
                 <a:tailEnd type="triangle" w="med" len="med"/>
@@ -17457,10 +17374,10 @@
           </p:cxnSp>
           <p:sp>
             <p:nvSpPr>
-              <p:cNvPr id="52" name="正方形/長方形 51">
+              <p:cNvPr id="78" name="正方形/長方形 77">
                 <a:extLst>
                   <a:ext uri="{FF2B5EF4-FFF2-40B4-BE49-F238E27FC236}">
-                    <a16:creationId xmlns:a16="http://schemas.microsoft.com/office/drawing/2014/main" id="{116CC47B-C1E5-4B43-AAAD-D87DFFF5ED4A}"/>
+                    <a16:creationId xmlns:a16="http://schemas.microsoft.com/office/drawing/2014/main" id="{42900F91-F000-41D2-9A08-DF7A954073F3}"/>
                   </a:ext>
                 </a:extLst>
               </p:cNvPr>
@@ -17475,6 +17392,14 @@
               <a:prstGeom prst="rect">
                 <a:avLst/>
               </a:prstGeom>
+              <a:solidFill>
+                <a:srgbClr val="6A737D"/>
+              </a:solidFill>
+              <a:ln>
+                <a:solidFill>
+                  <a:srgbClr val="22272E"/>
+                </a:solidFill>
+              </a:ln>
             </p:spPr>
             <p:style>
               <a:lnRef idx="2">
@@ -17504,10 +17429,10 @@
         </p:grpSp>
         <p:grpSp>
           <p:nvGrpSpPr>
-            <p:cNvPr id="72" name="グループ化 71">
+            <p:cNvPr id="57" name="グループ化 56">
               <a:extLst>
                 <a:ext uri="{FF2B5EF4-FFF2-40B4-BE49-F238E27FC236}">
-                  <a16:creationId xmlns:a16="http://schemas.microsoft.com/office/drawing/2014/main" id="{E112C067-22D9-468C-8916-F8120B0F3882}"/>
+                  <a16:creationId xmlns:a16="http://schemas.microsoft.com/office/drawing/2014/main" id="{9CB5ADAF-BC3B-406F-BDE4-5CDC875563A1}"/>
                 </a:ext>
               </a:extLst>
             </p:cNvPr>
@@ -17524,10 +17449,10 @@
           </p:grpSpPr>
           <p:cxnSp>
             <p:nvCxnSpPr>
-              <p:cNvPr id="60" name="直線コネクタ 59">
+              <p:cNvPr id="69" name="直線コネクタ 68">
                 <a:extLst>
                   <a:ext uri="{FF2B5EF4-FFF2-40B4-BE49-F238E27FC236}">
-                    <a16:creationId xmlns:a16="http://schemas.microsoft.com/office/drawing/2014/main" id="{63B5F7AB-0B71-414F-85BD-A52A74074CA0}"/>
+                    <a16:creationId xmlns:a16="http://schemas.microsoft.com/office/drawing/2014/main" id="{9CC72273-BE69-4B5D-8672-EFB32EB6A85E}"/>
                   </a:ext>
                 </a:extLst>
               </p:cNvPr>
@@ -17545,6 +17470,9 @@
                 <a:avLst/>
               </a:prstGeom>
               <a:ln w="57150">
+                <a:solidFill>
+                  <a:srgbClr val="28A745"/>
+                </a:solidFill>
                 <a:prstDash val="solid"/>
                 <a:headEnd type="none" w="med" len="med"/>
                 <a:tailEnd type="triangle" w="med" len="med"/>
@@ -17567,10 +17495,10 @@
           </p:cxnSp>
           <p:cxnSp>
             <p:nvCxnSpPr>
-              <p:cNvPr id="63" name="直線コネクタ 62">
+              <p:cNvPr id="70" name="直線コネクタ 69">
                 <a:extLst>
                   <a:ext uri="{FF2B5EF4-FFF2-40B4-BE49-F238E27FC236}">
-                    <a16:creationId xmlns:a16="http://schemas.microsoft.com/office/drawing/2014/main" id="{47781EEE-43C6-4C8D-A181-B7700E1FF179}"/>
+                    <a16:creationId xmlns:a16="http://schemas.microsoft.com/office/drawing/2014/main" id="{F03E46B9-205B-4813-BFF8-72A484A822B0}"/>
                   </a:ext>
                 </a:extLst>
               </p:cNvPr>
@@ -17588,6 +17516,9 @@
                 <a:avLst/>
               </a:prstGeom>
               <a:ln w="57150">
+                <a:solidFill>
+                  <a:srgbClr val="28A745"/>
+                </a:solidFill>
                 <a:prstDash val="solid"/>
                 <a:headEnd type="none" w="med" len="med"/>
                 <a:tailEnd type="none" w="med" len="med"/>
@@ -17610,10 +17541,10 @@
           </p:cxnSp>
           <p:cxnSp>
             <p:nvCxnSpPr>
-              <p:cNvPr id="66" name="直線コネクタ 65">
+              <p:cNvPr id="73" name="直線コネクタ 72">
                 <a:extLst>
                   <a:ext uri="{FF2B5EF4-FFF2-40B4-BE49-F238E27FC236}">
-                    <a16:creationId xmlns:a16="http://schemas.microsoft.com/office/drawing/2014/main" id="{C7417CAE-F4D9-4CE5-833F-D569748641E0}"/>
+                    <a16:creationId xmlns:a16="http://schemas.microsoft.com/office/drawing/2014/main" id="{AC076386-9BEC-4A5C-BE67-BFCC1605FAC7}"/>
                   </a:ext>
                 </a:extLst>
               </p:cNvPr>
@@ -17631,6 +17562,9 @@
                 <a:avLst/>
               </a:prstGeom>
               <a:ln w="57150">
+                <a:solidFill>
+                  <a:srgbClr val="28A745"/>
+                </a:solidFill>
                 <a:prstDash val="solid"/>
                 <a:headEnd type="none" w="med" len="med"/>
                 <a:tailEnd type="none" w="med" len="med"/>
@@ -17653,10 +17587,10 @@
           </p:cxnSp>
           <p:sp>
             <p:nvSpPr>
-              <p:cNvPr id="71" name="テキスト ボックス 70">
+              <p:cNvPr id="74" name="テキスト ボックス 73">
                 <a:extLst>
                   <a:ext uri="{FF2B5EF4-FFF2-40B4-BE49-F238E27FC236}">
-                    <a16:creationId xmlns:a16="http://schemas.microsoft.com/office/drawing/2014/main" id="{43DBA3A5-BBB0-42AF-8C41-13CBD78CC0AD}"/>
+                    <a16:creationId xmlns:a16="http://schemas.microsoft.com/office/drawing/2014/main" id="{74BF221E-1977-4567-B7C1-5C09781CC738}"/>
                   </a:ext>
                 </a:extLst>
               </p:cNvPr>
@@ -17682,13 +17616,10 @@
                 <a:pPr algn="r"/>
                 <a:r>
                   <a:rPr lang="en-US" altLang="ja-JP" sz="1400" dirty="0">
-                    <a:effectLst>
-                      <a:glow rad="101600">
-                        <a:schemeClr val="bg1">
-                          <a:alpha val="80000"/>
-                        </a:schemeClr>
-                      </a:glow>
-                    </a:effectLst>
+                    <a:solidFill>
+                      <a:srgbClr val="6A737D"/>
+                    </a:solidFill>
+                    <a:effectLst/>
                     <a:latin typeface="Times New Roman" panose="02020603050405020304" pitchFamily="18" charset="0"/>
                     <a:cs typeface="Times New Roman" panose="02020603050405020304" pitchFamily="18" charset="0"/>
                   </a:rPr>
@@ -17696,39 +17627,30 @@
                 </a:r>
                 <a:br>
                   <a:rPr lang="en-US" altLang="ja-JP" sz="1400" dirty="0">
-                    <a:effectLst>
-                      <a:glow rad="101600">
-                        <a:schemeClr val="bg1">
-                          <a:alpha val="80000"/>
-                        </a:schemeClr>
-                      </a:glow>
-                    </a:effectLst>
+                    <a:solidFill>
+                      <a:srgbClr val="6A737D"/>
+                    </a:solidFill>
+                    <a:effectLst/>
                     <a:latin typeface="Times New Roman" panose="02020603050405020304" pitchFamily="18" charset="0"/>
                     <a:cs typeface="Times New Roman" panose="02020603050405020304" pitchFamily="18" charset="0"/>
                   </a:rPr>
                 </a:br>
                 <a:r>
                   <a:rPr lang="en-US" altLang="ja-JP" sz="1400" dirty="0">
-                    <a:effectLst>
-                      <a:glow rad="101600">
-                        <a:schemeClr val="bg1">
-                          <a:alpha val="80000"/>
-                        </a:schemeClr>
-                      </a:glow>
-                    </a:effectLst>
+                    <a:solidFill>
+                      <a:srgbClr val="6A737D"/>
+                    </a:solidFill>
+                    <a:effectLst/>
                     <a:latin typeface="Times New Roman" panose="02020603050405020304" pitchFamily="18" charset="0"/>
                     <a:cs typeface="Times New Roman" panose="02020603050405020304" pitchFamily="18" charset="0"/>
                   </a:rPr>
                   <a:t>from a bag file</a:t>
                 </a:r>
                 <a:endParaRPr kumimoji="1" lang="ja-JP" altLang="en-US" sz="1400" dirty="0">
-                  <a:effectLst>
-                    <a:glow rad="101600">
-                      <a:schemeClr val="bg1">
-                        <a:alpha val="80000"/>
-                      </a:schemeClr>
-                    </a:glow>
-                  </a:effectLst>
+                  <a:solidFill>
+                    <a:srgbClr val="6A737D"/>
+                  </a:solidFill>
+                  <a:effectLst/>
                   <a:latin typeface="Times New Roman" panose="02020603050405020304" pitchFamily="18" charset="0"/>
                   <a:cs typeface="Times New Roman" panose="02020603050405020304" pitchFamily="18" charset="0"/>
                 </a:endParaRPr>
@@ -17738,10 +17660,10 @@
         </p:grpSp>
         <p:sp>
           <p:nvSpPr>
-            <p:cNvPr id="33" name="テキスト ボックス 32">
+            <p:cNvPr id="58" name="テキスト ボックス 57">
               <a:extLst>
                 <a:ext uri="{FF2B5EF4-FFF2-40B4-BE49-F238E27FC236}">
-                  <a16:creationId xmlns:a16="http://schemas.microsoft.com/office/drawing/2014/main" id="{79731791-5866-44C8-8C3F-0D5B054900B5}"/>
+                  <a16:creationId xmlns:a16="http://schemas.microsoft.com/office/drawing/2014/main" id="{3BFDB9C9-BD12-4218-B717-248FEC09A995}"/>
                 </a:ext>
               </a:extLst>
             </p:cNvPr>
@@ -17767,13 +17689,10 @@
               <a:pPr algn="ctr"/>
               <a:r>
                 <a:rPr lang="en-US" altLang="ja-JP" sz="1400" baseline="30000" dirty="0">
-                  <a:effectLst>
-                    <a:glow rad="101600">
-                      <a:schemeClr val="bg1">
-                        <a:alpha val="80000"/>
-                      </a:schemeClr>
-                    </a:glow>
-                  </a:effectLst>
+                  <a:solidFill>
+                    <a:srgbClr val="6A737D"/>
+                  </a:solidFill>
+                  <a:effectLst/>
                   <a:latin typeface="Times New Roman" panose="02020603050405020304" pitchFamily="18" charset="0"/>
                   <a:cs typeface="Times New Roman" panose="02020603050405020304" pitchFamily="18" charset="0"/>
                 </a:rPr>
@@ -17781,13 +17700,10 @@
               </a:r>
               <a:r>
                 <a:rPr kumimoji="1" lang="en-US" altLang="ja-JP" sz="1400" dirty="0">
-                  <a:effectLst>
-                    <a:glow rad="101600">
-                      <a:schemeClr val="bg1">
-                        <a:alpha val="80000"/>
-                      </a:schemeClr>
-                    </a:glow>
-                  </a:effectLst>
+                  <a:solidFill>
+                    <a:srgbClr val="6A737D"/>
+                  </a:solidFill>
+                  <a:effectLst/>
                   <a:latin typeface="Times New Roman" panose="02020603050405020304" pitchFamily="18" charset="0"/>
                   <a:cs typeface="Times New Roman" panose="02020603050405020304" pitchFamily="18" charset="0"/>
                 </a:rPr>
@@ -17795,13 +17711,10 @@
               </a:r>
               <a:r>
                 <a:rPr lang="en-US" altLang="ja-JP" sz="1400" dirty="0" err="1">
-                  <a:effectLst>
-                    <a:glow rad="101600">
-                      <a:schemeClr val="bg1">
-                        <a:alpha val="80000"/>
-                      </a:schemeClr>
-                    </a:glow>
-                  </a:effectLst>
+                  <a:solidFill>
+                    <a:srgbClr val="6A737D"/>
+                  </a:solidFill>
+                  <a:effectLst/>
                   <a:latin typeface="Times New Roman" panose="02020603050405020304" pitchFamily="18" charset="0"/>
                   <a:cs typeface="Times New Roman" panose="02020603050405020304" pitchFamily="18" charset="0"/>
                 </a:rPr>
@@ -17809,26 +17722,20 @@
               </a:r>
               <a:r>
                 <a:rPr kumimoji="1" lang="en-US" altLang="ja-JP" sz="1400" dirty="0" err="1">
-                  <a:effectLst>
-                    <a:glow rad="101600">
-                      <a:schemeClr val="bg1">
-                        <a:alpha val="80000"/>
-                      </a:schemeClr>
-                    </a:glow>
-                  </a:effectLst>
+                  <a:solidFill>
+                    <a:srgbClr val="6A737D"/>
+                  </a:solidFill>
+                  <a:effectLst/>
                   <a:latin typeface="Times New Roman" panose="02020603050405020304" pitchFamily="18" charset="0"/>
                   <a:cs typeface="Times New Roman" panose="02020603050405020304" pitchFamily="18" charset="0"/>
                 </a:rPr>
                 <a:t>npaused</a:t>
               </a:r>
               <a:endParaRPr kumimoji="1" lang="ja-JP" altLang="en-US" sz="1400" dirty="0">
-                <a:effectLst>
-                  <a:glow rad="101600">
-                    <a:schemeClr val="bg1">
-                      <a:alpha val="80000"/>
-                    </a:schemeClr>
-                  </a:glow>
-                </a:effectLst>
+                <a:solidFill>
+                  <a:srgbClr val="6A737D"/>
+                </a:solidFill>
+                <a:effectLst/>
                 <a:latin typeface="Times New Roman" panose="02020603050405020304" pitchFamily="18" charset="0"/>
                 <a:cs typeface="Times New Roman" panose="02020603050405020304" pitchFamily="18" charset="0"/>
               </a:endParaRPr>
@@ -17837,10 +17744,10 @@
         </p:sp>
         <p:grpSp>
           <p:nvGrpSpPr>
-            <p:cNvPr id="11" name="グループ化 10">
+            <p:cNvPr id="59" name="グループ化 58">
               <a:extLst>
                 <a:ext uri="{FF2B5EF4-FFF2-40B4-BE49-F238E27FC236}">
-                  <a16:creationId xmlns:a16="http://schemas.microsoft.com/office/drawing/2014/main" id="{8C6A899C-7F99-4930-894F-5E8E24BD3AEA}"/>
+                  <a16:creationId xmlns:a16="http://schemas.microsoft.com/office/drawing/2014/main" id="{65F9E163-1E6E-421F-B374-BAE694B4F98F}"/>
                 </a:ext>
               </a:extLst>
             </p:cNvPr>
@@ -17857,10 +17764,10 @@
           </p:grpSpPr>
           <p:cxnSp>
             <p:nvCxnSpPr>
-              <p:cNvPr id="39" name="直線コネクタ 38">
+              <p:cNvPr id="62" name="直線コネクタ 61">
                 <a:extLst>
                   <a:ext uri="{FF2B5EF4-FFF2-40B4-BE49-F238E27FC236}">
-                    <a16:creationId xmlns:a16="http://schemas.microsoft.com/office/drawing/2014/main" id="{7C0F0E43-F621-486B-BFEF-781204D82D75}"/>
+                    <a16:creationId xmlns:a16="http://schemas.microsoft.com/office/drawing/2014/main" id="{B970C1EC-4738-4E51-84AE-883DA4A63630}"/>
                   </a:ext>
                 </a:extLst>
               </p:cNvPr>
@@ -17879,7 +17786,7 @@
               </a:prstGeom>
               <a:ln w="57150">
                 <a:solidFill>
-                  <a:schemeClr val="accent6"/>
+                  <a:srgbClr val="28A745"/>
                 </a:solidFill>
                 <a:headEnd type="none" w="med" len="med"/>
                 <a:tailEnd type="triangle" w="med" len="med"/>
@@ -17902,10 +17809,10 @@
           </p:cxnSp>
           <p:sp>
             <p:nvSpPr>
-              <p:cNvPr id="40" name="テキスト ボックス 39">
+              <p:cNvPr id="64" name="テキスト ボックス 63">
                 <a:extLst>
                   <a:ext uri="{FF2B5EF4-FFF2-40B4-BE49-F238E27FC236}">
-                    <a16:creationId xmlns:a16="http://schemas.microsoft.com/office/drawing/2014/main" id="{8433F9F5-3AF8-48E0-B78C-32C3AE9D8416}"/>
+                    <a16:creationId xmlns:a16="http://schemas.microsoft.com/office/drawing/2014/main" id="{BBC00DDA-9F12-4DAB-98A5-A58D1C6F8C80}"/>
                   </a:ext>
                 </a:extLst>
               </p:cNvPr>
@@ -17931,13 +17838,10 @@
                 <a:pPr algn="ctr"/>
                 <a:r>
                   <a:rPr kumimoji="1" lang="en-US" altLang="ja-JP" sz="1400" dirty="0">
-                    <a:effectLst>
-                      <a:glow rad="101600">
-                        <a:schemeClr val="bg1">
-                          <a:alpha val="80000"/>
-                        </a:schemeClr>
-                      </a:glow>
-                    </a:effectLst>
+                    <a:solidFill>
+                      <a:srgbClr val="6A737D"/>
+                    </a:solidFill>
+                    <a:effectLst/>
                     <a:latin typeface="Times New Roman" panose="02020603050405020304" pitchFamily="18" charset="0"/>
                     <a:cs typeface="Times New Roman" panose="02020603050405020304" pitchFamily="18" charset="0"/>
                   </a:rPr>
@@ -17945,26 +17849,20 @@
                 </a:r>
                 <a:r>
                   <a:rPr kumimoji="1" lang="en-US" altLang="ja-JP" sz="1400" dirty="0" err="1">
-                    <a:effectLst>
-                      <a:glow rad="101600">
-                        <a:schemeClr val="bg1">
-                          <a:alpha val="80000"/>
-                        </a:schemeClr>
-                      </a:glow>
-                    </a:effectLst>
+                    <a:solidFill>
+                      <a:srgbClr val="6A737D"/>
+                    </a:solidFill>
+                    <a:effectLst/>
                     <a:latin typeface="Times New Roman" panose="02020603050405020304" pitchFamily="18" charset="0"/>
                     <a:cs typeface="Times New Roman" panose="02020603050405020304" pitchFamily="18" charset="0"/>
                   </a:rPr>
                   <a:t>set_link_state</a:t>
                 </a:r>
                 <a:endParaRPr kumimoji="1" lang="ja-JP" altLang="en-US" sz="1400" dirty="0">
-                  <a:effectLst>
-                    <a:glow rad="101600">
-                      <a:schemeClr val="bg1">
-                        <a:alpha val="80000"/>
-                      </a:schemeClr>
-                    </a:glow>
-                  </a:effectLst>
+                  <a:solidFill>
+                    <a:srgbClr val="6A737D"/>
+                  </a:solidFill>
+                  <a:effectLst/>
                   <a:latin typeface="Times New Roman" panose="02020603050405020304" pitchFamily="18" charset="0"/>
                   <a:cs typeface="Times New Roman" panose="02020603050405020304" pitchFamily="18" charset="0"/>
                 </a:endParaRPr>
@@ -17973,10 +17871,10 @@
           </p:sp>
           <p:cxnSp>
             <p:nvCxnSpPr>
-              <p:cNvPr id="41" name="直線コネクタ 40">
+              <p:cNvPr id="65" name="直線コネクタ 64">
                 <a:extLst>
                   <a:ext uri="{FF2B5EF4-FFF2-40B4-BE49-F238E27FC236}">
-                    <a16:creationId xmlns:a16="http://schemas.microsoft.com/office/drawing/2014/main" id="{3035AA29-7462-4D5E-8C12-E4B5DE4D0ED9}"/>
+                    <a16:creationId xmlns:a16="http://schemas.microsoft.com/office/drawing/2014/main" id="{56207170-F52E-426F-B926-18AE5CE024E7}"/>
                   </a:ext>
                 </a:extLst>
               </p:cNvPr>
@@ -17992,6 +17890,9 @@
                 <a:avLst/>
               </a:prstGeom>
               <a:ln w="57150">
+                <a:solidFill>
+                  <a:srgbClr val="6A737D"/>
+                </a:solidFill>
                 <a:prstDash val="sysDash"/>
                 <a:headEnd type="none" w="med" len="med"/>
                 <a:tailEnd type="triangle" w="med" len="med"/>
@@ -18014,10 +17915,10 @@
           </p:cxnSp>
           <p:sp>
             <p:nvSpPr>
-              <p:cNvPr id="42" name="正方形/長方形 41">
+              <p:cNvPr id="67" name="正方形/長方形 66">
                 <a:extLst>
                   <a:ext uri="{FF2B5EF4-FFF2-40B4-BE49-F238E27FC236}">
-                    <a16:creationId xmlns:a16="http://schemas.microsoft.com/office/drawing/2014/main" id="{4BAD9B3B-B32C-4685-B968-9394A02E23F7}"/>
+                    <a16:creationId xmlns:a16="http://schemas.microsoft.com/office/drawing/2014/main" id="{113F6772-8DD1-447D-BD94-5624C2F4DBD3}"/>
                   </a:ext>
                 </a:extLst>
               </p:cNvPr>
@@ -18032,6 +17933,14 @@
               <a:prstGeom prst="rect">
                 <a:avLst/>
               </a:prstGeom>
+              <a:solidFill>
+                <a:srgbClr val="6A737D"/>
+              </a:solidFill>
+              <a:ln>
+                <a:solidFill>
+                  <a:srgbClr val="22272E"/>
+                </a:solidFill>
+              </a:ln>
             </p:spPr>
             <p:style>
               <a:lnRef idx="2">
@@ -18060,10 +17969,10 @@
           </p:sp>
           <p:sp>
             <p:nvSpPr>
-              <p:cNvPr id="8" name="テキスト ボックス 7">
+              <p:cNvPr id="68" name="テキスト ボックス 67">
                 <a:extLst>
                   <a:ext uri="{FF2B5EF4-FFF2-40B4-BE49-F238E27FC236}">
-                    <a16:creationId xmlns:a16="http://schemas.microsoft.com/office/drawing/2014/main" id="{79B3D8F7-C530-4321-AFD5-111199762740}"/>
+                    <a16:creationId xmlns:a16="http://schemas.microsoft.com/office/drawing/2014/main" id="{19A186E2-781D-4B12-B1AA-ADD2A04CE629}"/>
                   </a:ext>
                 </a:extLst>
               </p:cNvPr>
@@ -18108,11 +18017,65 @@
             </p:txBody>
           </p:sp>
         </p:grpSp>
+        <p:sp>
+          <p:nvSpPr>
+            <p:cNvPr id="61" name="正方形/長方形 60">
+              <a:extLst>
+                <a:ext uri="{FF2B5EF4-FFF2-40B4-BE49-F238E27FC236}">
+                  <a16:creationId xmlns:a16="http://schemas.microsoft.com/office/drawing/2014/main" id="{B1667DC9-7466-400B-8BAB-261C93F16347}"/>
+                </a:ext>
+              </a:extLst>
+            </p:cNvPr>
+            <p:cNvSpPr/>
+            <p:nvPr/>
+          </p:nvSpPr>
+          <p:spPr>
+            <a:xfrm>
+              <a:off x="3837521" y="1778696"/>
+              <a:ext cx="727200" cy="4154348"/>
+            </a:xfrm>
+            <a:prstGeom prst="rect">
+              <a:avLst/>
+            </a:prstGeom>
+            <a:solidFill>
+              <a:srgbClr val="28A745"/>
+            </a:solidFill>
+            <a:ln>
+              <a:solidFill>
+                <a:srgbClr val="22272E"/>
+              </a:solidFill>
+            </a:ln>
+          </p:spPr>
+          <p:style>
+            <a:lnRef idx="2">
+              <a:schemeClr val="accent1">
+                <a:shade val="50000"/>
+              </a:schemeClr>
+            </a:lnRef>
+            <a:fillRef idx="1">
+              <a:schemeClr val="accent1"/>
+            </a:fillRef>
+            <a:effectRef idx="0">
+              <a:schemeClr val="accent1"/>
+            </a:effectRef>
+            <a:fontRef idx="minor">
+              <a:schemeClr val="lt1"/>
+            </a:fontRef>
+          </p:style>
+          <p:txBody>
+            <a:bodyPr rtlCol="0" anchor="ctr"/>
+            <a:lstStyle/>
+            <a:p>
+              <a:pPr algn="ctr"/>
+              <a:endParaRPr kumimoji="1" lang="ja-JP" altLang="en-US" dirty="0"/>
+            </a:p>
+          </p:txBody>
+        </p:sp>
       </p:grpSp>
     </p:spTree>
     <p:extLst>
       <p:ext uri="{BB962C8B-B14F-4D97-AF65-F5344CB8AC3E}">
-        <p14:creationId xmlns:p14="http://schemas.microsoft.com/office/powerpoint/2010/main" val="898529635"/>
+        <p14:creationId xmlns:p14="http://schemas.microsoft.com/office/powerpoint/2010/main" val="762006918"/>
       </p:ext>
     </p:extLst>
   </p:cSld>

</xml_diff>

<commit_message>
change colors in official github colors
</commit_message>
<xml_diff>
--- a/images/sequence_diagrams.pptx
+++ b/images/sequence_diagrams.pptx
@@ -14785,7 +14785,7 @@
               <a:r>
                 <a:rPr kumimoji="1" lang="en-US" altLang="ja-JP" sz="2000" b="1" dirty="0">
                   <a:solidFill>
-                    <a:srgbClr val="F6F8FA"/>
+                    <a:srgbClr val="D1D5DA"/>
                   </a:solidFill>
                 </a:rPr>
                 <a:t>Gazebo</a:t>
@@ -14793,21 +14793,21 @@
               <a:br>
                 <a:rPr kumimoji="1" lang="en-US" altLang="ja-JP" sz="2000" b="1" dirty="0">
                   <a:solidFill>
-                    <a:srgbClr val="F6F8FA"/>
+                    <a:srgbClr val="D1D5DA"/>
                   </a:solidFill>
                 </a:rPr>
               </a:br>
               <a:r>
                 <a:rPr kumimoji="1" lang="en-US" altLang="ja-JP" sz="1400" b="1" dirty="0">
                   <a:solidFill>
-                    <a:srgbClr val="F6F8FA"/>
+                    <a:srgbClr val="D1D5DA"/>
                   </a:solidFill>
                 </a:rPr>
                 <a:t>(w/ ROS API)</a:t>
               </a:r>
               <a:endParaRPr kumimoji="1" lang="ja-JP" altLang="en-US" sz="1400" b="1" dirty="0">
                 <a:solidFill>
-                  <a:srgbClr val="F6F8FA"/>
+                  <a:srgbClr val="D1D5DA"/>
                 </a:solidFill>
               </a:endParaRPr>
             </a:p>
@@ -14909,7 +14909,7 @@
               <a:r>
                 <a:rPr lang="en-US" altLang="ja-JP" sz="2000" b="1" dirty="0">
                   <a:solidFill>
-                    <a:srgbClr val="F6F8FA"/>
+                    <a:srgbClr val="D1D5DA"/>
                   </a:solidFill>
                 </a:rPr>
                 <a:t>create_</a:t>
@@ -14920,14 +14920,14 @@
               <a:r>
                 <a:rPr kumimoji="1" lang="en-US" altLang="ja-JP" sz="2000" b="1" dirty="0">
                   <a:solidFill>
-                    <a:srgbClr val="F6F8FA"/>
+                    <a:srgbClr val="D1D5DA"/>
                   </a:solidFill>
                 </a:rPr>
                 <a:t>snapshot</a:t>
               </a:r>
               <a:endParaRPr kumimoji="1" lang="ja-JP" altLang="en-US" sz="2000" b="1" dirty="0">
                 <a:solidFill>
-                  <a:srgbClr val="F6F8FA"/>
+                  <a:srgbClr val="D1D5DA"/>
                 </a:solidFill>
               </a:endParaRPr>
             </a:p>
@@ -16400,7 +16400,7 @@
               <a:r>
                 <a:rPr kumimoji="1" lang="en-US" altLang="ja-JP" sz="2000" b="1" dirty="0">
                   <a:solidFill>
-                    <a:srgbClr val="F6F8FA"/>
+                    <a:srgbClr val="D1D5DA"/>
                   </a:solidFill>
                 </a:rPr>
                 <a:t>Gazebo</a:t>
@@ -16408,21 +16408,21 @@
               <a:br>
                 <a:rPr kumimoji="1" lang="en-US" altLang="ja-JP" sz="2000" b="1" dirty="0">
                   <a:solidFill>
-                    <a:srgbClr val="F6F8FA"/>
+                    <a:srgbClr val="D1D5DA"/>
                   </a:solidFill>
                 </a:rPr>
               </a:br>
               <a:r>
                 <a:rPr kumimoji="1" lang="en-US" altLang="ja-JP" sz="1400" b="1" dirty="0">
                   <a:solidFill>
-                    <a:srgbClr val="F6F8FA"/>
+                    <a:srgbClr val="D1D5DA"/>
                   </a:solidFill>
                 </a:rPr>
                 <a:t>(w/ ROS API)</a:t>
               </a:r>
               <a:endParaRPr kumimoji="1" lang="ja-JP" altLang="en-US" sz="1400" b="1" dirty="0">
                 <a:solidFill>
-                  <a:srgbClr val="F6F8FA"/>
+                  <a:srgbClr val="D1D5DA"/>
                 </a:solidFill>
               </a:endParaRPr>
             </a:p>
@@ -16524,7 +16524,7 @@
               <a:r>
                 <a:rPr lang="en-US" altLang="ja-JP" sz="2000" b="1" dirty="0">
                   <a:solidFill>
-                    <a:srgbClr val="F6F8FA"/>
+                    <a:srgbClr val="D1D5DA"/>
                   </a:solidFill>
                 </a:rPr>
                 <a:t>r</a:t>
@@ -16532,7 +16532,7 @@
               <a:r>
                 <a:rPr kumimoji="1" lang="en-US" altLang="ja-JP" sz="2000" b="1" dirty="0">
                   <a:solidFill>
-                    <a:srgbClr val="F6F8FA"/>
+                    <a:srgbClr val="D1D5DA"/>
                   </a:solidFill>
                 </a:rPr>
                 <a:t>es</a:t>
@@ -16540,7 +16540,7 @@
               <a:r>
                 <a:rPr lang="en-US" altLang="ja-JP" sz="2000" b="1" dirty="0">
                   <a:solidFill>
-                    <a:srgbClr val="F6F8FA"/>
+                    <a:srgbClr val="D1D5DA"/>
                   </a:solidFill>
                 </a:rPr>
                 <a:t>tore_</a:t>
@@ -16551,14 +16551,14 @@
               <a:r>
                 <a:rPr kumimoji="1" lang="en-US" altLang="ja-JP" sz="2000" b="1" dirty="0">
                   <a:solidFill>
-                    <a:srgbClr val="F6F8FA"/>
+                    <a:srgbClr val="D1D5DA"/>
                   </a:solidFill>
                 </a:rPr>
                 <a:t>snapshot</a:t>
               </a:r>
               <a:endParaRPr kumimoji="1" lang="ja-JP" altLang="en-US" sz="2000" b="1" dirty="0">
                 <a:solidFill>
-                  <a:srgbClr val="F6F8FA"/>
+                  <a:srgbClr val="D1D5DA"/>
                 </a:solidFill>
               </a:endParaRPr>
             </a:p>
@@ -17999,7 +17999,7 @@
                 <a:r>
                   <a:rPr lang="en-US" altLang="ja-JP" sz="3000" b="1" dirty="0">
                     <a:solidFill>
-                      <a:schemeClr val="accent6"/>
+                      <a:srgbClr val="28A745"/>
                     </a:solidFill>
                     <a:latin typeface="Times New Roman" panose="02020603050405020304" pitchFamily="18" charset="0"/>
                     <a:cs typeface="Times New Roman" panose="02020603050405020304" pitchFamily="18" charset="0"/>
@@ -18008,7 +18008,7 @@
                 </a:r>
                 <a:endParaRPr kumimoji="1" lang="ja-JP" altLang="en-US" sz="3000" b="1" dirty="0">
                   <a:solidFill>
-                    <a:schemeClr val="accent6"/>
+                    <a:srgbClr val="28A745"/>
                   </a:solidFill>
                   <a:latin typeface="Times New Roman" panose="02020603050405020304" pitchFamily="18" charset="0"/>
                   <a:cs typeface="Times New Roman" panose="02020603050405020304" pitchFamily="18" charset="0"/>

</xml_diff>